<commit_message>
update model.file and train.py code
</commit_message>
<xml_diff>
--- a/MLPyTorch/PPT/XOROptimization.pptx
+++ b/MLPyTorch/PPT/XOROptimization.pptx
@@ -9,7 +9,12 @@
     <p:sldId id="260" r:id="rId3"/>
     <p:sldId id="257" r:id="rId4"/>
     <p:sldId id="262" r:id="rId5"/>
-    <p:sldId id="261" r:id="rId6"/>
+    <p:sldId id="263" r:id="rId6"/>
+    <p:sldId id="265" r:id="rId7"/>
+    <p:sldId id="266" r:id="rId8"/>
+    <p:sldId id="267" r:id="rId9"/>
+    <p:sldId id="268" r:id="rId10"/>
+    <p:sldId id="264" r:id="rId11"/>
   </p:sldIdLst>
   <p:sldSz cx="12192000" cy="6858000"/>
   <p:notesSz cx="6858000" cy="9144000"/>
@@ -108,6 +113,11 @@
       </a:defRPr>
     </a:lvl9pPr>
   </p:defaultTextStyle>
+  <p:extLst>
+    <p:ext uri="{EFAFB233-063F-42B5-8137-9DF3F51BA10A}">
+      <p15:sldGuideLst xmlns:p15="http://schemas.microsoft.com/office/powerpoint/2012/main"/>
+    </p:ext>
+  </p:extLst>
 </p:presentation>
 </file>
 
@@ -385,7 +395,7 @@
           <a:p>
             <a:fld id="{77A0394A-CB43-1740-A788-494626FDC08D}" type="datetimeFigureOut">
               <a:rPr kumimoji="1" lang="ja-JP" altLang="en-US" smtClean="0"/>
-              <a:t>2022/10/4</a:t>
+              <a:t>2022/10/6</a:t>
             </a:fld>
             <a:endParaRPr kumimoji="1" lang="ja-JP" altLang="en-US"/>
           </a:p>
@@ -799,7 +809,7 @@
           <a:p>
             <a:fld id="{77A0394A-CB43-1740-A788-494626FDC08D}" type="datetimeFigureOut">
               <a:rPr kumimoji="1" lang="ja-JP" altLang="en-US" smtClean="0"/>
-              <a:t>2022/10/4</a:t>
+              <a:t>2022/10/6</a:t>
             </a:fld>
             <a:endParaRPr kumimoji="1" lang="ja-JP" altLang="en-US"/>
           </a:p>
@@ -1135,7 +1145,7 @@
           <a:p>
             <a:fld id="{77A0394A-CB43-1740-A788-494626FDC08D}" type="datetimeFigureOut">
               <a:rPr kumimoji="1" lang="ja-JP" altLang="en-US" smtClean="0"/>
-              <a:t>2022/10/4</a:t>
+              <a:t>2022/10/6</a:t>
             </a:fld>
             <a:endParaRPr kumimoji="1" lang="ja-JP" altLang="en-US"/>
           </a:p>
@@ -1540,7 +1550,7 @@
           <a:p>
             <a:fld id="{77A0394A-CB43-1740-A788-494626FDC08D}" type="datetimeFigureOut">
               <a:rPr kumimoji="1" lang="ja-JP" altLang="en-US" smtClean="0"/>
-              <a:t>2022/10/4</a:t>
+              <a:t>2022/10/6</a:t>
             </a:fld>
             <a:endParaRPr kumimoji="1" lang="ja-JP" altLang="en-US"/>
           </a:p>
@@ -2108,7 +2118,7 @@
           <a:p>
             <a:fld id="{77A0394A-CB43-1740-A788-494626FDC08D}" type="datetimeFigureOut">
               <a:rPr kumimoji="1" lang="ja-JP" altLang="en-US" smtClean="0"/>
-              <a:t>2022/10/4</a:t>
+              <a:t>2022/10/6</a:t>
             </a:fld>
             <a:endParaRPr kumimoji="1" lang="ja-JP" altLang="en-US"/>
           </a:p>
@@ -2789,7 +2799,7 @@
           <a:p>
             <a:fld id="{77A0394A-CB43-1740-A788-494626FDC08D}" type="datetimeFigureOut">
               <a:rPr kumimoji="1" lang="ja-JP" altLang="en-US" smtClean="0"/>
-              <a:t>2022/10/4</a:t>
+              <a:t>2022/10/6</a:t>
             </a:fld>
             <a:endParaRPr kumimoji="1" lang="ja-JP" altLang="en-US"/>
           </a:p>
@@ -3702,7 +3712,7 @@
           <a:p>
             <a:fld id="{77A0394A-CB43-1740-A788-494626FDC08D}" type="datetimeFigureOut">
               <a:rPr kumimoji="1" lang="ja-JP" altLang="en-US" smtClean="0"/>
-              <a:t>2022/10/4</a:t>
+              <a:t>2022/10/6</a:t>
             </a:fld>
             <a:endParaRPr kumimoji="1" lang="ja-JP" altLang="en-US"/>
           </a:p>
@@ -4047,7 +4057,7 @@
           <a:p>
             <a:fld id="{77A0394A-CB43-1740-A788-494626FDC08D}" type="datetimeFigureOut">
               <a:rPr kumimoji="1" lang="ja-JP" altLang="en-US" smtClean="0"/>
-              <a:t>2022/10/4</a:t>
+              <a:t>2022/10/6</a:t>
             </a:fld>
             <a:endParaRPr kumimoji="1" lang="ja-JP" altLang="en-US"/>
           </a:p>
@@ -4343,7 +4353,7 @@
           <a:p>
             <a:fld id="{77A0394A-CB43-1740-A788-494626FDC08D}" type="datetimeFigureOut">
               <a:rPr kumimoji="1" lang="ja-JP" altLang="en-US" smtClean="0"/>
-              <a:t>2022/10/4</a:t>
+              <a:t>2022/10/6</a:t>
             </a:fld>
             <a:endParaRPr kumimoji="1" lang="ja-JP" altLang="en-US"/>
           </a:p>
@@ -4698,7 +4708,7 @@
           <a:p>
             <a:fld id="{77A0394A-CB43-1740-A788-494626FDC08D}" type="datetimeFigureOut">
               <a:rPr kumimoji="1" lang="ja-JP" altLang="en-US" smtClean="0"/>
-              <a:t>2022/10/4</a:t>
+              <a:t>2022/10/6</a:t>
             </a:fld>
             <a:endParaRPr kumimoji="1" lang="ja-JP" altLang="en-US"/>
           </a:p>
@@ -5087,7 +5097,7 @@
           <a:p>
             <a:fld id="{77A0394A-CB43-1740-A788-494626FDC08D}" type="datetimeFigureOut">
               <a:rPr kumimoji="1" lang="ja-JP" altLang="en-US" smtClean="0"/>
-              <a:t>2022/10/4</a:t>
+              <a:t>2022/10/6</a:t>
             </a:fld>
             <a:endParaRPr kumimoji="1" lang="ja-JP" altLang="en-US"/>
           </a:p>
@@ -5527,7 +5537,7 @@
           <a:p>
             <a:fld id="{77A0394A-CB43-1740-A788-494626FDC08D}" type="datetimeFigureOut">
               <a:rPr kumimoji="1" lang="ja-JP" altLang="en-US" smtClean="0"/>
-              <a:t>2022/10/4</a:t>
+              <a:t>2022/10/6</a:t>
             </a:fld>
             <a:endParaRPr kumimoji="1" lang="ja-JP" altLang="en-US"/>
           </a:p>
@@ -6097,7 +6107,7 @@
           <a:p>
             <a:fld id="{77A0394A-CB43-1740-A788-494626FDC08D}" type="datetimeFigureOut">
               <a:rPr kumimoji="1" lang="ja-JP" altLang="en-US" smtClean="0"/>
-              <a:t>2022/10/4</a:t>
+              <a:t>2022/10/6</a:t>
             </a:fld>
             <a:endParaRPr kumimoji="1" lang="ja-JP" altLang="en-US"/>
           </a:p>
@@ -6354,7 +6364,7 @@
           <a:p>
             <a:fld id="{77A0394A-CB43-1740-A788-494626FDC08D}" type="datetimeFigureOut">
               <a:rPr kumimoji="1" lang="ja-JP" altLang="en-US" smtClean="0"/>
-              <a:t>2022/10/4</a:t>
+              <a:t>2022/10/6</a:t>
             </a:fld>
             <a:endParaRPr kumimoji="1" lang="ja-JP" altLang="en-US"/>
           </a:p>
@@ -6517,7 +6527,7 @@
           <a:p>
             <a:fld id="{77A0394A-CB43-1740-A788-494626FDC08D}" type="datetimeFigureOut">
               <a:rPr kumimoji="1" lang="ja-JP" altLang="en-US" smtClean="0"/>
-              <a:t>2022/10/4</a:t>
+              <a:t>2022/10/6</a:t>
             </a:fld>
             <a:endParaRPr kumimoji="1" lang="ja-JP" altLang="en-US"/>
           </a:p>
@@ -6939,7 +6949,7 @@
           <a:p>
             <a:fld id="{77A0394A-CB43-1740-A788-494626FDC08D}" type="datetimeFigureOut">
               <a:rPr kumimoji="1" lang="ja-JP" altLang="en-US" smtClean="0"/>
-              <a:t>2022/10/4</a:t>
+              <a:t>2022/10/6</a:t>
             </a:fld>
             <a:endParaRPr kumimoji="1" lang="ja-JP" altLang="en-US"/>
           </a:p>
@@ -7348,7 +7358,7 @@
           <a:p>
             <a:fld id="{77A0394A-CB43-1740-A788-494626FDC08D}" type="datetimeFigureOut">
               <a:rPr kumimoji="1" lang="ja-JP" altLang="en-US" smtClean="0"/>
-              <a:t>2022/10/4</a:t>
+              <a:t>2022/10/6</a:t>
             </a:fld>
             <a:endParaRPr kumimoji="1" lang="ja-JP" altLang="en-US"/>
           </a:p>
@@ -7624,7 +7634,7 @@
           <a:p>
             <a:fld id="{77A0394A-CB43-1740-A788-494626FDC08D}" type="datetimeFigureOut">
               <a:rPr kumimoji="1" lang="ja-JP" altLang="en-US" smtClean="0"/>
-              <a:t>2022/10/4</a:t>
+              <a:t>2022/10/6</a:t>
             </a:fld>
             <a:endParaRPr kumimoji="1" lang="ja-JP" altLang="en-US"/>
           </a:p>
@@ -8116,6 +8126,320 @@
 </p:sld>
 </file>
 
+<file path=ppt/slides/slide10.xml><?xml version="1.0" encoding="utf-8"?>
+<p:sld xmlns:a="http://schemas.openxmlformats.org/drawingml/2006/main" xmlns:r="http://schemas.openxmlformats.org/officeDocument/2006/relationships" xmlns:p="http://schemas.openxmlformats.org/presentationml/2006/main">
+  <p:cSld>
+    <p:spTree>
+      <p:nvGrpSpPr>
+        <p:cNvPr id="1" name=""/>
+        <p:cNvGrpSpPr/>
+        <p:nvPr/>
+      </p:nvGrpSpPr>
+      <p:grpSpPr>
+        <a:xfrm>
+          <a:off x="0" y="0"/>
+          <a:ext cx="0" cy="0"/>
+          <a:chOff x="0" y="0"/>
+          <a:chExt cx="0" cy="0"/>
+        </a:xfrm>
+      </p:grpSpPr>
+      <p:sp>
+        <p:nvSpPr>
+          <p:cNvPr id="2" name="タイトル 1">
+            <a:extLst>
+              <a:ext uri="{FF2B5EF4-FFF2-40B4-BE49-F238E27FC236}">
+                <a16:creationId xmlns:a16="http://schemas.microsoft.com/office/drawing/2014/main" id="{8CCB54F5-078B-5242-92AC-F709E55E7108}"/>
+              </a:ext>
+            </a:extLst>
+          </p:cNvPr>
+          <p:cNvSpPr>
+            <a:spLocks noGrp="1"/>
+          </p:cNvSpPr>
+          <p:nvPr>
+            <p:ph type="title"/>
+          </p:nvPr>
+        </p:nvSpPr>
+        <p:spPr/>
+        <p:txBody>
+          <a:bodyPr/>
+          <a:lstStyle/>
+          <a:p>
+            <a:r>
+              <a:rPr kumimoji="1" lang="ja-JP" altLang="en-US"/>
+              <a:t>参考文献</a:t>
+            </a:r>
+          </a:p>
+        </p:txBody>
+      </p:sp>
+      <p:sp>
+        <p:nvSpPr>
+          <p:cNvPr id="3" name="コンテンツ プレースホルダー 2">
+            <a:extLst>
+              <a:ext uri="{FF2B5EF4-FFF2-40B4-BE49-F238E27FC236}">
+                <a16:creationId xmlns:a16="http://schemas.microsoft.com/office/drawing/2014/main" id="{6362B25C-F8A6-4A41-AB11-32964E9EE1B0}"/>
+              </a:ext>
+            </a:extLst>
+          </p:cNvPr>
+          <p:cNvSpPr>
+            <a:spLocks noGrp="1"/>
+          </p:cNvSpPr>
+          <p:nvPr>
+            <p:ph idx="1"/>
+          </p:nvPr>
+        </p:nvSpPr>
+        <p:spPr>
+          <a:xfrm>
+            <a:off x="680321" y="2349229"/>
+            <a:ext cx="9613861" cy="3599316"/>
+          </a:xfrm>
+        </p:spPr>
+        <p:txBody>
+          <a:bodyPr/>
+          <a:lstStyle/>
+          <a:p>
+            <a:pPr marL="342900" indent="-342900">
+              <a:buFont typeface="+mj-lt"/>
+              <a:buAutoNum type="arabicPeriod"/>
+            </a:pPr>
+            <a:r>
+              <a:rPr kumimoji="1" lang="ja-JP" altLang="en-US" sz="1400"/>
+              <a:t>バッチ正規化</a:t>
+            </a:r>
+            <a:r>
+              <a:rPr kumimoji="1" lang="en-US" altLang="ja-JP" sz="1400" dirty="0"/>
+              <a:t>(</a:t>
+            </a:r>
+            <a:r>
+              <a:rPr kumimoji="1" lang="vi-VN" altLang="ja-JP" sz="1400" dirty="0"/>
+              <a:t>Batch Normalization)</a:t>
+            </a:r>
+            <a:r>
+              <a:rPr kumimoji="1" lang="ja-JP" altLang="en-US" sz="1400"/>
+              <a:t>とその発展型　（</a:t>
+            </a:r>
+            <a:r>
+              <a:rPr kumimoji="1" lang="en-US" altLang="ja-JP" sz="1400" dirty="0"/>
+              <a:t>2021/8/24, </a:t>
+            </a:r>
+            <a:r>
+              <a:rPr kumimoji="1" lang="vi-VN" altLang="ja-JP" sz="1400" dirty="0"/>
+              <a:t>Masaki Hayashi)</a:t>
+            </a:r>
+            <a:endParaRPr lang="en-US" altLang="ja-JP" sz="1400" dirty="0"/>
+          </a:p>
+          <a:p>
+            <a:pPr marL="457200" lvl="1" indent="0">
+              <a:buNone/>
+            </a:pPr>
+            <a:r>
+              <a:rPr kumimoji="1" lang="en-US" altLang="ja-JP" sz="1000" dirty="0">
+                <a:hlinkClick r:id="rId2"/>
+              </a:rPr>
+              <a:t>https://cvml-expertguide.net/terms/dl/layers/batch-normalization-layer/</a:t>
+            </a:r>
+            <a:endParaRPr kumimoji="1" lang="en-US" altLang="ja-JP" sz="1000" dirty="0"/>
+          </a:p>
+          <a:p>
+            <a:pPr marL="342900" indent="-342900">
+              <a:buFont typeface="+mj-lt"/>
+              <a:buAutoNum type="arabicPeriod"/>
+            </a:pPr>
+            <a:r>
+              <a:rPr kumimoji="1" lang="ja-JP" altLang="en-US" sz="1400"/>
+              <a:t>第</a:t>
+            </a:r>
+            <a:r>
+              <a:rPr kumimoji="1" lang="en-US" altLang="ja-JP" sz="1400" dirty="0"/>
+              <a:t>1</a:t>
+            </a:r>
+            <a:r>
+              <a:rPr kumimoji="1" lang="ja-JP" altLang="en-US" sz="1400"/>
+              <a:t>回　難しくない！　</a:t>
+            </a:r>
+            <a:r>
+              <a:rPr kumimoji="1" lang="en-US" altLang="ja-JP" sz="1400" dirty="0" err="1"/>
+              <a:t>PyTorch</a:t>
+            </a:r>
+            <a:r>
+              <a:rPr kumimoji="1" lang="ja-JP" altLang="en-US" sz="1400"/>
+              <a:t>でニューラルネットワークの基本</a:t>
+            </a:r>
+            <a:r>
+              <a:rPr kumimoji="1" lang="en-US" altLang="ja-JP" sz="1400" dirty="0"/>
+              <a:t> (2020/2/6, </a:t>
+            </a:r>
+            <a:r>
+              <a:rPr kumimoji="1" lang="ja-JP" altLang="en-US" sz="1400"/>
+              <a:t>一色政彦</a:t>
+            </a:r>
+            <a:r>
+              <a:rPr kumimoji="1" lang="en-US" altLang="ja-JP" sz="1400" dirty="0"/>
+              <a:t>)</a:t>
+            </a:r>
+          </a:p>
+          <a:p>
+            <a:pPr marL="457200" lvl="1" indent="0">
+              <a:buNone/>
+            </a:pPr>
+            <a:r>
+              <a:rPr kumimoji="1" lang="en-US" altLang="ja-JP" sz="1000" dirty="0">
+                <a:hlinkClick r:id="rId3"/>
+              </a:rPr>
+              <a:t>https://atmarkit.itmedia.co.jp/ait/articles/2002/06/news025.html</a:t>
+            </a:r>
+            <a:endParaRPr kumimoji="1" lang="en-US" altLang="ja-JP" sz="1000" dirty="0"/>
+          </a:p>
+          <a:p>
+            <a:pPr marL="342900" indent="-342900">
+              <a:buFont typeface="+mj-lt"/>
+              <a:buAutoNum type="arabicPeriod"/>
+            </a:pPr>
+            <a:r>
+              <a:rPr kumimoji="1" lang="ja-JP" altLang="en-US" sz="1400"/>
+              <a:t>全結合層（</a:t>
+            </a:r>
+            <a:r>
+              <a:rPr kumimoji="1" lang="en-US" altLang="ja-JP" sz="1400" dirty="0"/>
+              <a:t>Affine</a:t>
+            </a:r>
+            <a:r>
+              <a:rPr kumimoji="1" lang="ja-JP" altLang="en-US" sz="1400"/>
+              <a:t>層）</a:t>
+            </a:r>
+            <a:r>
+              <a:rPr kumimoji="1" lang="en-US" altLang="ja-JP" sz="1400" dirty="0"/>
+              <a:t>(</a:t>
+            </a:r>
+            <a:r>
+              <a:rPr lang="en-US" altLang="ja-JP" sz="1400" dirty="0" err="1"/>
+              <a:t>C</a:t>
+            </a:r>
+            <a:r>
+              <a:rPr kumimoji="1" lang="en-US" altLang="ja-JP" sz="1400" dirty="0" err="1"/>
+              <a:t>ognicull</a:t>
+            </a:r>
+            <a:r>
+              <a:rPr kumimoji="1" lang="en-US" altLang="ja-JP" sz="1400" dirty="0"/>
+              <a:t>)</a:t>
+            </a:r>
+          </a:p>
+          <a:p>
+            <a:pPr marL="457200" lvl="1" indent="0">
+              <a:buNone/>
+            </a:pPr>
+            <a:r>
+              <a:rPr kumimoji="1" lang="en-US" altLang="ja-JP" sz="1000" dirty="0">
+                <a:hlinkClick r:id="rId4"/>
+              </a:rPr>
+              <a:t>https://cognicull.com/ja/bj4lou4n</a:t>
+            </a:r>
+            <a:endParaRPr lang="en-US" altLang="ja-JP" sz="1000" dirty="0"/>
+          </a:p>
+          <a:p>
+            <a:pPr marL="342900" indent="-342900">
+              <a:buFont typeface="+mj-lt"/>
+              <a:buAutoNum type="arabicPeriod"/>
+            </a:pPr>
+            <a:r>
+              <a:rPr lang="en-US" altLang="ja-JP" sz="1400" dirty="0"/>
+              <a:t>LEARN THE BASICS (</a:t>
+            </a:r>
+            <a:r>
+              <a:rPr lang="en-US" altLang="ja-JP" sz="1400" dirty="0" err="1"/>
+              <a:t>PyTorch</a:t>
+            </a:r>
+            <a:r>
+              <a:rPr lang="ja-JP" altLang="en-US" sz="1400"/>
+              <a:t>公式サイト）</a:t>
+            </a:r>
+            <a:endParaRPr lang="en-US" altLang="ja-JP" sz="1400" dirty="0"/>
+          </a:p>
+          <a:p>
+            <a:pPr marL="457200" lvl="1" indent="0">
+              <a:buNone/>
+            </a:pPr>
+            <a:r>
+              <a:rPr kumimoji="1" lang="en-US" altLang="ja-JP" sz="1000" dirty="0">
+                <a:hlinkClick r:id="rId5"/>
+              </a:rPr>
+              <a:t>https://pytorch.org/tutorials/beginner/basics/intro.html</a:t>
+            </a:r>
+            <a:endParaRPr kumimoji="1" lang="en-US" altLang="ja-JP" sz="1000" dirty="0"/>
+          </a:p>
+          <a:p>
+            <a:pPr marL="342900" indent="-342900">
+              <a:buFont typeface="+mj-lt"/>
+              <a:buAutoNum type="arabicPeriod"/>
+            </a:pPr>
+            <a:r>
+              <a:rPr kumimoji="1" lang="en-US" altLang="ja-JP" sz="1400" dirty="0" err="1"/>
+              <a:t>PyTorch</a:t>
+            </a:r>
+            <a:r>
+              <a:rPr kumimoji="1" lang="ja-JP" altLang="en-US" sz="1400"/>
+              <a:t>で</a:t>
+            </a:r>
+            <a:r>
+              <a:rPr kumimoji="1" lang="en-US" altLang="ja-JP" sz="1400" dirty="0"/>
+              <a:t>XOR</a:t>
+            </a:r>
+            <a:r>
+              <a:rPr kumimoji="1" lang="ja-JP" altLang="en-US" sz="1400"/>
+              <a:t>を実装してみる</a:t>
+            </a:r>
+            <a:r>
+              <a:rPr kumimoji="1" lang="en-US" altLang="ja-JP" sz="1400" dirty="0"/>
+              <a:t> (2020/11/4, </a:t>
+            </a:r>
+            <a:r>
+              <a:rPr kumimoji="1" lang="en-US" altLang="ja-JP" sz="1400" dirty="0" err="1"/>
+              <a:t>Kimisyo</a:t>
+            </a:r>
+            <a:r>
+              <a:rPr kumimoji="1" lang="en-US" altLang="ja-JP" sz="1400" dirty="0"/>
+              <a:t>)</a:t>
+            </a:r>
+          </a:p>
+          <a:p>
+            <a:pPr marL="457200" lvl="1" indent="0">
+              <a:buNone/>
+            </a:pPr>
+            <a:r>
+              <a:rPr kumimoji="1" lang="vi-VN" altLang="ja-JP" sz="1000" dirty="0">
+                <a:hlinkClick r:id="rId6"/>
+              </a:rPr>
+              <a:t>https://qiita.com/kimisyo/items/590ebb9317e60023086f</a:t>
+            </a:r>
+            <a:endParaRPr kumimoji="1" lang="vi-VN" altLang="ja-JP" sz="1000" dirty="0"/>
+          </a:p>
+          <a:p>
+            <a:pPr marL="457200" lvl="1" indent="0">
+              <a:buNone/>
+            </a:pPr>
+            <a:endParaRPr kumimoji="1" lang="ja-JP" altLang="en-US" sz="1000"/>
+          </a:p>
+          <a:p>
+            <a:pPr marL="342900" indent="-342900">
+              <a:buFont typeface="+mj-lt"/>
+              <a:buAutoNum type="arabicPeriod"/>
+            </a:pPr>
+            <a:endParaRPr kumimoji="1" lang="en-US" altLang="ja-JP" sz="1400" dirty="0"/>
+          </a:p>
+        </p:txBody>
+      </p:sp>
+    </p:spTree>
+    <p:extLst>
+      <p:ext uri="{BB962C8B-B14F-4D97-AF65-F5344CB8AC3E}">
+        <p14:creationId xmlns:p14="http://schemas.microsoft.com/office/powerpoint/2010/main" val="2901879620"/>
+      </p:ext>
+    </p:extLst>
+  </p:cSld>
+  <p:clrMapOvr>
+    <a:masterClrMapping/>
+  </p:clrMapOvr>
+</p:sld>
+</file>
+
 <file path=ppt/slides/slide2.xml><?xml version="1.0" encoding="utf-8"?>
 <p:sld xmlns:a="http://schemas.openxmlformats.org/drawingml/2006/main" xmlns:r="http://schemas.openxmlformats.org/officeDocument/2006/relationships" xmlns:p="http://schemas.openxmlformats.org/presentationml/2006/main">
   <p:cSld>
@@ -8733,9 +9057,82 @@
           </a:fontRef>
         </p:style>
         <p:txBody>
-          <a:bodyPr/>
+          <a:bodyPr>
+            <a:normAutofit fontScale="92500"/>
+          </a:bodyPr>
           <a:lstStyle/>
           <a:p>
+            <a:pPr marL="285750" indent="-285750">
+              <a:lnSpc>
+                <a:spcPct val="150000"/>
+              </a:lnSpc>
+              <a:buFont typeface="Wingdings" pitchFamily="2" charset="2"/>
+              <a:buChar char="Ø"/>
+            </a:pPr>
+            <a:r>
+              <a:rPr kumimoji="1" lang="en-US" altLang="ja-JP" dirty="0" err="1"/>
+              <a:t>PyTorch</a:t>
+            </a:r>
+            <a:r>
+              <a:rPr kumimoji="1" lang="ja-JP" altLang="en-US"/>
+              <a:t>フレームワークを用いて、パラメータの配列、活性化関数や損失関数を省略できるし、短時間でモデルを構築することができる。</a:t>
+            </a:r>
+            <a:endParaRPr kumimoji="1" lang="en-US" altLang="ja-JP" dirty="0"/>
+          </a:p>
+          <a:p>
+            <a:pPr marL="285750" indent="-285750">
+              <a:lnSpc>
+                <a:spcPct val="150000"/>
+              </a:lnSpc>
+              <a:buFont typeface="Wingdings" pitchFamily="2" charset="2"/>
+              <a:buChar char="Ø"/>
+            </a:pPr>
+            <a:r>
+              <a:rPr kumimoji="1" lang="ja-JP" altLang="en-US"/>
+              <a:t>実験結果では、</a:t>
+            </a:r>
+            <a:r>
+              <a:rPr kumimoji="1" lang="en-US" altLang="ja-JP" dirty="0" err="1"/>
+              <a:t>ADaGrad</a:t>
+            </a:r>
+            <a:r>
+              <a:rPr kumimoji="1" lang="ja-JP" altLang="en-US"/>
+              <a:t>アルゴリズムは学習スピードが一番早い。</a:t>
+            </a:r>
+            <a:endParaRPr kumimoji="1" lang="en-US" altLang="ja-JP" dirty="0"/>
+          </a:p>
+          <a:p>
+            <a:pPr marL="285750" indent="-285750">
+              <a:lnSpc>
+                <a:spcPct val="150000"/>
+              </a:lnSpc>
+              <a:buFont typeface="Wingdings" pitchFamily="2" charset="2"/>
+              <a:buChar char="Ø"/>
+            </a:pPr>
+            <a:r>
+              <a:rPr lang="en-US" altLang="ja-JP" dirty="0"/>
+              <a:t>XOR</a:t>
+            </a:r>
+            <a:r>
+              <a:rPr lang="ja-JP" altLang="en-US"/>
+              <a:t>などの単純な</a:t>
+            </a:r>
+            <a:r>
+              <a:rPr lang="en-US" altLang="ja-JP" dirty="0"/>
+              <a:t>NN</a:t>
+            </a:r>
+            <a:r>
+              <a:rPr lang="ja-JP" altLang="en-US"/>
+              <a:t>モデルでは</a:t>
+            </a:r>
+            <a:r>
+              <a:rPr lang="en-US" altLang="ja-JP" dirty="0"/>
+              <a:t>Xavier</a:t>
+            </a:r>
+            <a:r>
+              <a:rPr lang="ja-JP" altLang="en-US"/>
+              <a:t>の初期値があまり効果がない。</a:t>
+            </a:r>
             <a:endParaRPr kumimoji="1" lang="ja-JP" altLang="en-US"/>
           </a:p>
         </p:txBody>
@@ -10280,6 +10677,41 @@
 <file path=ppt/slides/slide5.xml><?xml version="1.0" encoding="utf-8"?>
 <p:sld xmlns:a="http://schemas.openxmlformats.org/drawingml/2006/main" xmlns:r="http://schemas.openxmlformats.org/officeDocument/2006/relationships" xmlns:p="http://schemas.openxmlformats.org/presentationml/2006/main">
   <p:cSld>
+    <p:bg>
+      <p:bgPr>
+        <a:gradFill rotWithShape="1">
+          <a:gsLst>
+            <a:gs pos="0">
+              <a:schemeClr val="bg2">
+                <a:tint val="96000"/>
+                <a:shade val="100000"/>
+                <a:hueMod val="270000"/>
+                <a:satMod val="200000"/>
+                <a:lumMod val="128000"/>
+              </a:schemeClr>
+            </a:gs>
+            <a:gs pos="50000">
+              <a:schemeClr val="bg2">
+                <a:shade val="100000"/>
+                <a:hueMod val="100000"/>
+                <a:satMod val="110000"/>
+                <a:lumMod val="130000"/>
+              </a:schemeClr>
+            </a:gs>
+            <a:gs pos="100000">
+              <a:schemeClr val="bg2">
+                <a:shade val="78000"/>
+                <a:hueMod val="44000"/>
+                <a:satMod val="200000"/>
+                <a:lumMod val="69000"/>
+              </a:schemeClr>
+            </a:gs>
+          </a:gsLst>
+          <a:lin ang="2520000" scaled="0"/>
+        </a:gradFill>
+        <a:effectLst/>
+      </p:bgPr>
+    </p:bg>
     <p:spTree>
       <p:nvGrpSpPr>
         <p:cNvPr id="1" name=""/>
@@ -10294,582 +10726,3502 @@
           <a:chExt cx="0" cy="0"/>
         </a:xfrm>
       </p:grpSpPr>
-      <mc:AlternateContent xmlns:mc="http://schemas.openxmlformats.org/markup-compatibility/2006">
-        <mc:Choice xmlns:a14="http://schemas.microsoft.com/office/drawing/2010/main" Requires="a14">
-          <p:sp>
-            <p:nvSpPr>
-              <p:cNvPr id="2" name="テキスト ボックス 1">
-                <a:extLst>
-                  <a:ext uri="{FF2B5EF4-FFF2-40B4-BE49-F238E27FC236}">
-                    <a16:creationId xmlns:a16="http://schemas.microsoft.com/office/drawing/2014/main" id="{A8EC4A17-B064-3147-A49C-53A273DC077F}"/>
-                  </a:ext>
-                </a:extLst>
-              </p:cNvPr>
-              <p:cNvSpPr txBox="1"/>
-              <p:nvPr/>
-            </p:nvSpPr>
-            <p:spPr>
-              <a:xfrm>
-                <a:off x="1201592" y="4874007"/>
-                <a:ext cx="9033307" cy="467564"/>
-              </a:xfrm>
-              <a:prstGeom prst="rect">
-                <a:avLst/>
-              </a:prstGeom>
+      <p:sp>
+        <p:nvSpPr>
+          <p:cNvPr id="1031" name="Rectangle 1030">
+            <a:extLst>
+              <a:ext uri="{FF2B5EF4-FFF2-40B4-BE49-F238E27FC236}">
+                <a16:creationId xmlns:a16="http://schemas.microsoft.com/office/drawing/2014/main" id="{B1E308AB-D93B-478B-A5DF-58D4D08A5BF4}"/>
+              </a:ext>
+              <a:ext uri="{C183D7F6-B498-43B3-948B-1728B52AA6E4}">
+                <adec:decorative xmlns:adec="http://schemas.microsoft.com/office/drawing/2017/decorative" val="1"/>
+              </a:ext>
+            </a:extLst>
+          </p:cNvPr>
+          <p:cNvSpPr>
+            <a:spLocks noGrp="1" noRot="1" noChangeAspect="1" noMove="1" noResize="1" noEditPoints="1" noAdjustHandles="1" noChangeArrowheads="1" noChangeShapeType="1" noTextEdit="1"/>
+          </p:cNvSpPr>
+          <p:nvPr>
+            <p:extLst>
+              <p:ext uri="{386F3935-93C4-4BCD-93E2-E3B085C9AB24}">
+                <p16:designElem xmlns:p16="http://schemas.microsoft.com/office/powerpoint/2015/main" val="1"/>
+              </p:ext>
+            </p:extLst>
+          </p:nvPr>
+        </p:nvSpPr>
+        <p:spPr>
+          <a:xfrm>
+            <a:off x="160866" y="160868"/>
+            <a:ext cx="11867089" cy="6053666"/>
+          </a:xfrm>
+          <a:prstGeom prst="rect">
+            <a:avLst/>
+          </a:prstGeom>
+          <a:solidFill>
+            <a:srgbClr val="FFFFFF"/>
+          </a:solidFill>
+          <a:ln>
+            <a:noFill/>
+          </a:ln>
+          <a:effectLst>
+            <a:outerShdw blurRad="76200" dist="63500" dir="5040000" algn="ctr" rotWithShape="0">
+              <a:srgbClr val="000000">
+                <a:alpha val="41000"/>
+              </a:srgbClr>
+            </a:outerShdw>
+          </a:effectLst>
+        </p:spPr>
+        <p:style>
+          <a:lnRef idx="2">
+            <a:schemeClr val="accent1">
+              <a:shade val="50000"/>
+            </a:schemeClr>
+          </a:lnRef>
+          <a:fillRef idx="1">
+            <a:schemeClr val="accent1"/>
+          </a:fillRef>
+          <a:effectRef idx="0">
+            <a:schemeClr val="accent1"/>
+          </a:effectRef>
+          <a:fontRef idx="minor">
+            <a:schemeClr val="lt1"/>
+          </a:fontRef>
+        </p:style>
+        <p:txBody>
+          <a:bodyPr rtlCol="0" anchor="ctr"/>
+          <a:lstStyle/>
+          <a:p>
+            <a:pPr algn="ctr"/>
+            <a:endParaRPr lang="en-US"/>
+          </a:p>
+        </p:txBody>
+      </p:sp>
+      <p:pic>
+        <p:nvPicPr>
+          <p:cNvPr id="3" name="図 2">
+            <a:extLst>
+              <a:ext uri="{FF2B5EF4-FFF2-40B4-BE49-F238E27FC236}">
+                <a16:creationId xmlns:a16="http://schemas.microsoft.com/office/drawing/2014/main" id="{7ADA1956-C03B-3F47-B99A-B94523776815}"/>
+              </a:ext>
+            </a:extLst>
+          </p:cNvPr>
+          <p:cNvPicPr>
+            <a:picLocks noChangeAspect="1"/>
+          </p:cNvPicPr>
+          <p:nvPr/>
+        </p:nvPicPr>
+        <p:blipFill rotWithShape="1">
+          <a:blip r:embed="rId2"/>
+          <a:srcRect l="4694" t="4026" r="4626" b="3810"/>
+          <a:stretch/>
+        </p:blipFill>
+        <p:spPr>
+          <a:xfrm>
+            <a:off x="808223" y="279727"/>
+            <a:ext cx="4754865" cy="5840095"/>
+          </a:xfrm>
+          <a:prstGeom prst="rect">
+            <a:avLst/>
+          </a:prstGeom>
+          <a:ln>
+            <a:noFill/>
+          </a:ln>
+          <a:effectLst/>
+        </p:spPr>
+      </p:pic>
+      <p:cxnSp>
+        <p:nvCxnSpPr>
+          <p:cNvPr id="1033" name="Straight Connector 1032">
+            <a:extLst>
+              <a:ext uri="{FF2B5EF4-FFF2-40B4-BE49-F238E27FC236}">
+                <a16:creationId xmlns:a16="http://schemas.microsoft.com/office/drawing/2014/main" id="{2E228421-88FE-4C66-A08E-3B9FDA7D7429}"/>
+              </a:ext>
+              <a:ext uri="{C183D7F6-B498-43B3-948B-1728B52AA6E4}">
+                <adec:decorative xmlns:adec="http://schemas.microsoft.com/office/drawing/2017/decorative" val="1"/>
+              </a:ext>
+            </a:extLst>
+          </p:cNvPr>
+          <p:cNvCxnSpPr>
+            <a:cxnSpLocks noGrp="1" noRot="1" noChangeAspect="1" noMove="1" noResize="1" noEditPoints="1" noAdjustHandles="1" noChangeArrowheads="1" noChangeShapeType="1"/>
+          </p:cNvCxnSpPr>
+          <p:nvPr>
+            <p:extLst>
+              <p:ext uri="{386F3935-93C4-4BCD-93E2-E3B085C9AB24}">
+                <p16:designElem xmlns:p16="http://schemas.microsoft.com/office/powerpoint/2015/main" val="1"/>
+              </p:ext>
+            </p:extLst>
+          </p:nvPr>
+        </p:nvCxnSpPr>
+        <p:spPr>
+          <a:xfrm>
+            <a:off x="6094410" y="1395167"/>
+            <a:ext cx="0" cy="3638746"/>
+          </a:xfrm>
+          <a:prstGeom prst="line">
+            <a:avLst/>
+          </a:prstGeom>
+        </p:spPr>
+        <p:style>
+          <a:lnRef idx="1">
+            <a:schemeClr val="accent1"/>
+          </a:lnRef>
+          <a:fillRef idx="0">
+            <a:schemeClr val="accent1"/>
+          </a:fillRef>
+          <a:effectRef idx="0">
+            <a:schemeClr val="accent1"/>
+          </a:effectRef>
+          <a:fontRef idx="minor">
+            <a:schemeClr val="tx1"/>
+          </a:fontRef>
+        </p:style>
+      </p:cxnSp>
+      <p:pic>
+        <p:nvPicPr>
+          <p:cNvPr id="1026" name="Picture 2">
+            <a:extLst>
+              <a:ext uri="{FF2B5EF4-FFF2-40B4-BE49-F238E27FC236}">
+                <a16:creationId xmlns:a16="http://schemas.microsoft.com/office/drawing/2014/main" id="{53FCEF5F-2A42-5B48-8B2D-75B0E5D37AF8}"/>
+              </a:ext>
+            </a:extLst>
+          </p:cNvPr>
+          <p:cNvPicPr>
+            <a:picLocks noChangeAspect="1" noChangeArrowheads="1"/>
+          </p:cNvPicPr>
+          <p:nvPr/>
+        </p:nvPicPr>
+        <p:blipFill>
+          <a:blip r:embed="rId3">
+            <a:extLst>
+              <a:ext uri="{28A0092B-C50C-407E-A947-70E740481C1C}">
+                <a14:useLocalDpi xmlns:a14="http://schemas.microsoft.com/office/drawing/2010/main" val="0"/>
+              </a:ext>
+            </a:extLst>
+          </a:blip>
+          <a:stretch>
+            <a:fillRect/>
+          </a:stretch>
+        </p:blipFill>
+        <p:spPr bwMode="auto">
+          <a:xfrm>
+            <a:off x="6412584" y="934369"/>
+            <a:ext cx="4010930" cy="4506662"/>
+          </a:xfrm>
+          <a:prstGeom prst="rect">
+            <a:avLst/>
+          </a:prstGeom>
+          <a:noFill/>
+          <a:ln>
+            <a:noFill/>
+          </a:ln>
+          <a:effectLst/>
+          <a:extLst>
+            <a:ext uri="{909E8E84-426E-40DD-AFC4-6F175D3DCCD1}">
+              <a14:hiddenFill xmlns:a14="http://schemas.microsoft.com/office/drawing/2010/main">
+                <a:solidFill>
+                  <a:srgbClr val="FFFFFF"/>
+                </a:solidFill>
+              </a14:hiddenFill>
+            </a:ext>
+          </a:extLst>
+        </p:spPr>
+      </p:pic>
+      <p:pic>
+        <p:nvPicPr>
+          <p:cNvPr id="1035" name="Picture 1034">
+            <a:extLst>
+              <a:ext uri="{FF2B5EF4-FFF2-40B4-BE49-F238E27FC236}">
+                <a16:creationId xmlns:a16="http://schemas.microsoft.com/office/drawing/2014/main" id="{8E222AD7-48E8-4EF8-96A9-2F657D9B0500}"/>
+              </a:ext>
+              <a:ext uri="{C183D7F6-B498-43B3-948B-1728B52AA6E4}">
+                <adec:decorative xmlns:adec="http://schemas.microsoft.com/office/drawing/2017/decorative" val="1"/>
+              </a:ext>
+            </a:extLst>
+          </p:cNvPr>
+          <p:cNvPicPr>
+            <a:picLocks noGrp="1" noRot="1" noChangeAspect="1" noMove="1" noResize="1" noEditPoints="1" noAdjustHandles="1" noChangeArrowheads="1" noChangeShapeType="1" noCrop="1"/>
+          </p:cNvPicPr>
+          <p:nvPr>
+            <p:extLst>
+              <p:ext uri="{386F3935-93C4-4BCD-93E2-E3B085C9AB24}">
+                <p16:designElem xmlns:p16="http://schemas.microsoft.com/office/powerpoint/2015/main" val="1"/>
+              </p:ext>
+            </p:extLst>
+          </p:nvPr>
+        </p:nvPicPr>
+        <p:blipFill>
+          <a:blip r:embed="rId4">
+            <a:extLst>
+              <a:ext uri="{28A0092B-C50C-407E-A947-70E740481C1C}">
+                <a14:useLocalDpi xmlns:a14="http://schemas.microsoft.com/office/drawing/2010/main" val="0"/>
+              </a:ext>
+            </a:extLst>
+          </a:blip>
+          <a:stretch>
+            <a:fillRect/>
+          </a:stretch>
+        </p:blipFill>
+        <p:spPr>
+          <a:xfrm>
+            <a:off x="10585826" y="1961506"/>
+            <a:ext cx="1602997" cy="144270"/>
+          </a:xfrm>
+          <a:prstGeom prst="rect">
+            <a:avLst/>
+          </a:prstGeom>
+        </p:spPr>
+      </p:pic>
+      <p:sp>
+        <p:nvSpPr>
+          <p:cNvPr id="1037" name="Rectangle 1036">
+            <a:extLst>
+              <a:ext uri="{FF2B5EF4-FFF2-40B4-BE49-F238E27FC236}">
+                <a16:creationId xmlns:a16="http://schemas.microsoft.com/office/drawing/2014/main" id="{9842EB88-EABD-411D-B5A1-523921303D18}"/>
+              </a:ext>
+              <a:ext uri="{C183D7F6-B498-43B3-948B-1728B52AA6E4}">
+                <adec:decorative xmlns:adec="http://schemas.microsoft.com/office/drawing/2017/decorative" val="1"/>
+              </a:ext>
+            </a:extLst>
+          </p:cNvPr>
+          <p:cNvSpPr>
+            <a:spLocks noGrp="1" noRot="1" noChangeAspect="1" noMove="1" noResize="1" noEditPoints="1" noAdjustHandles="1" noChangeArrowheads="1" noChangeShapeType="1" noTextEdit="1"/>
+          </p:cNvSpPr>
+          <p:nvPr>
+            <p:extLst>
+              <p:ext uri="{386F3935-93C4-4BCD-93E2-E3B085C9AB24}">
+                <p16:designElem xmlns:p16="http://schemas.microsoft.com/office/powerpoint/2015/main" val="1"/>
+              </p:ext>
+            </p:extLst>
+          </p:nvPr>
+        </p:nvSpPr>
+        <p:spPr>
+          <a:xfrm>
+            <a:off x="10585827" y="609600"/>
+            <a:ext cx="1602997" cy="1368198"/>
+          </a:xfrm>
+          <a:prstGeom prst="rect">
+            <a:avLst/>
+          </a:prstGeom>
+          <a:solidFill>
+            <a:schemeClr val="accent1"/>
+          </a:solidFill>
+          <a:ln>
+            <a:noFill/>
+          </a:ln>
+        </p:spPr>
+        <p:style>
+          <a:lnRef idx="2">
+            <a:schemeClr val="accent1">
+              <a:shade val="50000"/>
+            </a:schemeClr>
+          </a:lnRef>
+          <a:fillRef idx="1">
+            <a:schemeClr val="accent1"/>
+          </a:fillRef>
+          <a:effectRef idx="0">
+            <a:schemeClr val="accent1"/>
+          </a:effectRef>
+          <a:fontRef idx="minor">
+            <a:schemeClr val="lt1"/>
+          </a:fontRef>
+        </p:style>
+      </p:sp>
+      <p:sp>
+        <p:nvSpPr>
+          <p:cNvPr id="9" name="正方形/長方形 8">
+            <a:extLst>
+              <a:ext uri="{FF2B5EF4-FFF2-40B4-BE49-F238E27FC236}">
+                <a16:creationId xmlns:a16="http://schemas.microsoft.com/office/drawing/2014/main" id="{3FB3F911-96EF-EB40-8920-B502E8A6C0AB}"/>
+              </a:ext>
+            </a:extLst>
+          </p:cNvPr>
+          <p:cNvSpPr/>
+          <p:nvPr/>
+        </p:nvSpPr>
+        <p:spPr>
+          <a:xfrm>
+            <a:off x="1284563" y="803198"/>
+            <a:ext cx="679568" cy="107575"/>
+          </a:xfrm>
+          <a:prstGeom prst="rect">
+            <a:avLst/>
+          </a:prstGeom>
+          <a:noFill/>
+        </p:spPr>
+        <p:style>
+          <a:lnRef idx="2">
+            <a:schemeClr val="accent1">
+              <a:shade val="50000"/>
+            </a:schemeClr>
+          </a:lnRef>
+          <a:fillRef idx="1">
+            <a:schemeClr val="accent1"/>
+          </a:fillRef>
+          <a:effectRef idx="0">
+            <a:schemeClr val="accent1"/>
+          </a:effectRef>
+          <a:fontRef idx="minor">
+            <a:schemeClr val="lt1"/>
+          </a:fontRef>
+        </p:style>
+        <p:txBody>
+          <a:bodyPr rtlCol="0" anchor="ctr"/>
+          <a:lstStyle/>
+          <a:p>
+            <a:pPr algn="ctr"/>
+            <a:endParaRPr kumimoji="1" lang="ja-JP" altLang="en-US"/>
+          </a:p>
+        </p:txBody>
+      </p:sp>
+      <p:sp>
+        <p:nvSpPr>
+          <p:cNvPr id="10" name="正方形/長方形 9">
+            <a:extLst>
+              <a:ext uri="{FF2B5EF4-FFF2-40B4-BE49-F238E27FC236}">
+                <a16:creationId xmlns:a16="http://schemas.microsoft.com/office/drawing/2014/main" id="{AE71C1C9-05C4-8941-8D72-C847CCA8CC74}"/>
+              </a:ext>
+            </a:extLst>
+          </p:cNvPr>
+          <p:cNvSpPr/>
+          <p:nvPr/>
+        </p:nvSpPr>
+        <p:spPr>
+          <a:xfrm>
+            <a:off x="1284563" y="1233296"/>
+            <a:ext cx="3416291" cy="1122198"/>
+          </a:xfrm>
+          <a:prstGeom prst="rect">
+            <a:avLst/>
+          </a:prstGeom>
+          <a:noFill/>
+        </p:spPr>
+        <p:style>
+          <a:lnRef idx="2">
+            <a:schemeClr val="accent1">
+              <a:shade val="50000"/>
+            </a:schemeClr>
+          </a:lnRef>
+          <a:fillRef idx="1">
+            <a:schemeClr val="accent1"/>
+          </a:fillRef>
+          <a:effectRef idx="0">
+            <a:schemeClr val="accent1"/>
+          </a:effectRef>
+          <a:fontRef idx="minor">
+            <a:schemeClr val="lt1"/>
+          </a:fontRef>
+        </p:style>
+        <p:txBody>
+          <a:bodyPr rtlCol="0" anchor="ctr"/>
+          <a:lstStyle/>
+          <a:p>
+            <a:pPr algn="ctr"/>
+            <a:endParaRPr kumimoji="1" lang="ja-JP" altLang="en-US"/>
+          </a:p>
+        </p:txBody>
+      </p:sp>
+      <p:sp>
+        <p:nvSpPr>
+          <p:cNvPr id="11" name="正方形/長方形 10">
+            <a:extLst>
+              <a:ext uri="{FF2B5EF4-FFF2-40B4-BE49-F238E27FC236}">
+                <a16:creationId xmlns:a16="http://schemas.microsoft.com/office/drawing/2014/main" id="{C05C9937-249F-214A-9178-4CCF3F6AA075}"/>
+              </a:ext>
+            </a:extLst>
+          </p:cNvPr>
+          <p:cNvSpPr/>
+          <p:nvPr/>
+        </p:nvSpPr>
+        <p:spPr>
+          <a:xfrm>
+            <a:off x="1284563" y="2462215"/>
+            <a:ext cx="1046521" cy="107575"/>
+          </a:xfrm>
+          <a:prstGeom prst="rect">
+            <a:avLst/>
+          </a:prstGeom>
+          <a:noFill/>
+        </p:spPr>
+        <p:style>
+          <a:lnRef idx="2">
+            <a:schemeClr val="accent1">
+              <a:shade val="50000"/>
+            </a:schemeClr>
+          </a:lnRef>
+          <a:fillRef idx="1">
+            <a:schemeClr val="accent1"/>
+          </a:fillRef>
+          <a:effectRef idx="0">
+            <a:schemeClr val="accent1"/>
+          </a:effectRef>
+          <a:fontRef idx="minor">
+            <a:schemeClr val="lt1"/>
+          </a:fontRef>
+        </p:style>
+        <p:txBody>
+          <a:bodyPr rtlCol="0" anchor="ctr"/>
+          <a:lstStyle/>
+          <a:p>
+            <a:pPr algn="ctr"/>
+            <a:endParaRPr kumimoji="1" lang="ja-JP" altLang="en-US"/>
+          </a:p>
+        </p:txBody>
+      </p:sp>
+      <p:sp>
+        <p:nvSpPr>
+          <p:cNvPr id="12" name="正方形/長方形 11">
+            <a:extLst>
+              <a:ext uri="{FF2B5EF4-FFF2-40B4-BE49-F238E27FC236}">
+                <a16:creationId xmlns:a16="http://schemas.microsoft.com/office/drawing/2014/main" id="{3B326AF9-88CE-624B-9B74-8DC5DD984747}"/>
+              </a:ext>
+            </a:extLst>
+          </p:cNvPr>
+          <p:cNvSpPr/>
+          <p:nvPr/>
+        </p:nvSpPr>
+        <p:spPr>
+          <a:xfrm>
+            <a:off x="1284563" y="3014041"/>
+            <a:ext cx="2863155" cy="2227300"/>
+          </a:xfrm>
+          <a:prstGeom prst="rect">
+            <a:avLst/>
+          </a:prstGeom>
+          <a:noFill/>
+        </p:spPr>
+        <p:style>
+          <a:lnRef idx="2">
+            <a:schemeClr val="accent1">
+              <a:shade val="50000"/>
+            </a:schemeClr>
+          </a:lnRef>
+          <a:fillRef idx="1">
+            <a:schemeClr val="accent1"/>
+          </a:fillRef>
+          <a:effectRef idx="0">
+            <a:schemeClr val="accent1"/>
+          </a:effectRef>
+          <a:fontRef idx="minor">
+            <a:schemeClr val="lt1"/>
+          </a:fontRef>
+        </p:style>
+        <p:txBody>
+          <a:bodyPr rtlCol="0" anchor="ctr"/>
+          <a:lstStyle/>
+          <a:p>
+            <a:pPr algn="ctr"/>
+            <a:endParaRPr kumimoji="1" lang="ja-JP" altLang="en-US"/>
+          </a:p>
+        </p:txBody>
+      </p:sp>
+      <p:sp>
+        <p:nvSpPr>
+          <p:cNvPr id="13" name="正方形/長方形 12">
+            <a:extLst>
+              <a:ext uri="{FF2B5EF4-FFF2-40B4-BE49-F238E27FC236}">
+                <a16:creationId xmlns:a16="http://schemas.microsoft.com/office/drawing/2014/main" id="{0B3AF286-4637-224A-B882-741B34459200}"/>
+              </a:ext>
+            </a:extLst>
+          </p:cNvPr>
+          <p:cNvSpPr/>
+          <p:nvPr/>
+        </p:nvSpPr>
+        <p:spPr>
+          <a:xfrm>
+            <a:off x="1284563" y="5460056"/>
+            <a:ext cx="4113003" cy="107575"/>
+          </a:xfrm>
+          <a:prstGeom prst="rect">
+            <a:avLst/>
+          </a:prstGeom>
+          <a:noFill/>
+        </p:spPr>
+        <p:style>
+          <a:lnRef idx="2">
+            <a:schemeClr val="accent1">
+              <a:shade val="50000"/>
+            </a:schemeClr>
+          </a:lnRef>
+          <a:fillRef idx="1">
+            <a:schemeClr val="accent1"/>
+          </a:fillRef>
+          <a:effectRef idx="0">
+            <a:schemeClr val="accent1"/>
+          </a:effectRef>
+          <a:fontRef idx="minor">
+            <a:schemeClr val="lt1"/>
+          </a:fontRef>
+        </p:style>
+        <p:txBody>
+          <a:bodyPr rtlCol="0" anchor="ctr"/>
+          <a:lstStyle/>
+          <a:p>
+            <a:pPr algn="ctr"/>
+            <a:endParaRPr kumimoji="1" lang="ja-JP" altLang="en-US"/>
+          </a:p>
+        </p:txBody>
+      </p:sp>
+      <p:sp>
+        <p:nvSpPr>
+          <p:cNvPr id="23" name="正方形/長方形 22">
+            <a:extLst>
+              <a:ext uri="{FF2B5EF4-FFF2-40B4-BE49-F238E27FC236}">
+                <a16:creationId xmlns:a16="http://schemas.microsoft.com/office/drawing/2014/main" id="{7BF82FF5-6153-C040-A7A8-8EC8B22B336D}"/>
+              </a:ext>
+            </a:extLst>
+          </p:cNvPr>
+          <p:cNvSpPr/>
+          <p:nvPr/>
+        </p:nvSpPr>
+        <p:spPr>
+          <a:xfrm>
+            <a:off x="1459372" y="3566046"/>
+            <a:ext cx="1640370" cy="107575"/>
+          </a:xfrm>
+          <a:prstGeom prst="rect">
+            <a:avLst/>
+          </a:prstGeom>
+          <a:noFill/>
+        </p:spPr>
+        <p:style>
+          <a:lnRef idx="2">
+            <a:schemeClr val="accent1">
+              <a:shade val="50000"/>
+            </a:schemeClr>
+          </a:lnRef>
+          <a:fillRef idx="1">
+            <a:schemeClr val="accent1"/>
+          </a:fillRef>
+          <a:effectRef idx="0">
+            <a:schemeClr val="accent1"/>
+          </a:effectRef>
+          <a:fontRef idx="minor">
+            <a:schemeClr val="lt1"/>
+          </a:fontRef>
+        </p:style>
+        <p:txBody>
+          <a:bodyPr rtlCol="0" anchor="ctr"/>
+          <a:lstStyle/>
+          <a:p>
+            <a:pPr algn="ctr"/>
+            <a:endParaRPr kumimoji="1" lang="ja-JP" altLang="en-US"/>
+          </a:p>
+        </p:txBody>
+      </p:sp>
+      <p:sp>
+        <p:nvSpPr>
+          <p:cNvPr id="28" name="正方形/長方形 27">
+            <a:extLst>
+              <a:ext uri="{FF2B5EF4-FFF2-40B4-BE49-F238E27FC236}">
+                <a16:creationId xmlns:a16="http://schemas.microsoft.com/office/drawing/2014/main" id="{E9BF9950-1817-F04D-A423-E63591F3F2E6}"/>
+              </a:ext>
+            </a:extLst>
+          </p:cNvPr>
+          <p:cNvSpPr/>
+          <p:nvPr/>
+        </p:nvSpPr>
+        <p:spPr>
+          <a:xfrm>
+            <a:off x="1459372" y="3236256"/>
+            <a:ext cx="1256768" cy="107575"/>
+          </a:xfrm>
+          <a:prstGeom prst="rect">
+            <a:avLst/>
+          </a:prstGeom>
+          <a:noFill/>
+        </p:spPr>
+        <p:style>
+          <a:lnRef idx="2">
+            <a:schemeClr val="accent1">
+              <a:shade val="50000"/>
+            </a:schemeClr>
+          </a:lnRef>
+          <a:fillRef idx="1">
+            <a:schemeClr val="accent1"/>
+          </a:fillRef>
+          <a:effectRef idx="0">
+            <a:schemeClr val="accent1"/>
+          </a:effectRef>
+          <a:fontRef idx="minor">
+            <a:schemeClr val="lt1"/>
+          </a:fontRef>
+        </p:style>
+        <p:txBody>
+          <a:bodyPr rtlCol="0" anchor="ctr"/>
+          <a:lstStyle/>
+          <a:p>
+            <a:pPr algn="ctr"/>
+            <a:endParaRPr kumimoji="1" lang="ja-JP" altLang="en-US"/>
+          </a:p>
+        </p:txBody>
+      </p:sp>
+      <p:sp>
+        <p:nvSpPr>
+          <p:cNvPr id="33" name="正方形/長方形 32">
+            <a:extLst>
+              <a:ext uri="{FF2B5EF4-FFF2-40B4-BE49-F238E27FC236}">
+                <a16:creationId xmlns:a16="http://schemas.microsoft.com/office/drawing/2014/main" id="{B035830A-FF9C-7542-8B80-99968A6DE206}"/>
+              </a:ext>
+            </a:extLst>
+          </p:cNvPr>
+          <p:cNvSpPr/>
+          <p:nvPr/>
+        </p:nvSpPr>
+        <p:spPr>
+          <a:xfrm>
+            <a:off x="1482190" y="4026525"/>
+            <a:ext cx="1256768" cy="189611"/>
+          </a:xfrm>
+          <a:prstGeom prst="rect">
+            <a:avLst/>
+          </a:prstGeom>
+          <a:noFill/>
+        </p:spPr>
+        <p:style>
+          <a:lnRef idx="2">
+            <a:schemeClr val="accent1">
+              <a:shade val="50000"/>
+            </a:schemeClr>
+          </a:lnRef>
+          <a:fillRef idx="1">
+            <a:schemeClr val="accent1"/>
+          </a:fillRef>
+          <a:effectRef idx="0">
+            <a:schemeClr val="accent1"/>
+          </a:effectRef>
+          <a:fontRef idx="minor">
+            <a:schemeClr val="lt1"/>
+          </a:fontRef>
+        </p:style>
+        <p:txBody>
+          <a:bodyPr rtlCol="0" anchor="ctr"/>
+          <a:lstStyle/>
+          <a:p>
+            <a:pPr algn="ctr"/>
+            <a:endParaRPr kumimoji="1" lang="ja-JP" altLang="en-US"/>
+          </a:p>
+        </p:txBody>
+      </p:sp>
+      <p:sp>
+        <p:nvSpPr>
+          <p:cNvPr id="37" name="正方形/長方形 36">
+            <a:extLst>
+              <a:ext uri="{FF2B5EF4-FFF2-40B4-BE49-F238E27FC236}">
+                <a16:creationId xmlns:a16="http://schemas.microsoft.com/office/drawing/2014/main" id="{4EB88313-B1B4-2746-BABB-1C7ADAEBB955}"/>
+              </a:ext>
+            </a:extLst>
+          </p:cNvPr>
+          <p:cNvSpPr/>
+          <p:nvPr/>
+        </p:nvSpPr>
+        <p:spPr>
+          <a:xfrm>
+            <a:off x="1482190" y="4225626"/>
+            <a:ext cx="1256768" cy="120227"/>
+          </a:xfrm>
+          <a:prstGeom prst="rect">
+            <a:avLst/>
+          </a:prstGeom>
+          <a:noFill/>
+        </p:spPr>
+        <p:style>
+          <a:lnRef idx="2">
+            <a:schemeClr val="accent1">
+              <a:shade val="50000"/>
+            </a:schemeClr>
+          </a:lnRef>
+          <a:fillRef idx="1">
+            <a:schemeClr val="accent1"/>
+          </a:fillRef>
+          <a:effectRef idx="0">
+            <a:schemeClr val="accent1"/>
+          </a:effectRef>
+          <a:fontRef idx="minor">
+            <a:schemeClr val="lt1"/>
+          </a:fontRef>
+        </p:style>
+        <p:txBody>
+          <a:bodyPr rtlCol="0" anchor="ctr"/>
+          <a:lstStyle/>
+          <a:p>
+            <a:pPr algn="ctr"/>
+            <a:endParaRPr kumimoji="1" lang="ja-JP" altLang="en-US"/>
+          </a:p>
+        </p:txBody>
+      </p:sp>
+      <p:sp>
+        <p:nvSpPr>
+          <p:cNvPr id="42" name="正方形/長方形 41">
+            <a:extLst>
+              <a:ext uri="{FF2B5EF4-FFF2-40B4-BE49-F238E27FC236}">
+                <a16:creationId xmlns:a16="http://schemas.microsoft.com/office/drawing/2014/main" id="{458DCEB0-A100-FB46-B7BE-FA2C92F865F0}"/>
+              </a:ext>
+            </a:extLst>
+          </p:cNvPr>
+          <p:cNvSpPr/>
+          <p:nvPr/>
+        </p:nvSpPr>
+        <p:spPr>
+          <a:xfrm>
+            <a:off x="1482190" y="4564568"/>
+            <a:ext cx="2018750" cy="120227"/>
+          </a:xfrm>
+          <a:prstGeom prst="rect">
+            <a:avLst/>
+          </a:prstGeom>
+          <a:noFill/>
+        </p:spPr>
+        <p:style>
+          <a:lnRef idx="2">
+            <a:schemeClr val="accent1">
+              <a:shade val="50000"/>
+            </a:schemeClr>
+          </a:lnRef>
+          <a:fillRef idx="1">
+            <a:schemeClr val="accent1"/>
+          </a:fillRef>
+          <a:effectRef idx="0">
+            <a:schemeClr val="accent1"/>
+          </a:effectRef>
+          <a:fontRef idx="minor">
+            <a:schemeClr val="lt1"/>
+          </a:fontRef>
+        </p:style>
+        <p:txBody>
+          <a:bodyPr rtlCol="0" anchor="ctr"/>
+          <a:lstStyle/>
+          <a:p>
+            <a:pPr algn="ctr"/>
+            <a:endParaRPr kumimoji="1" lang="ja-JP" altLang="en-US"/>
+          </a:p>
+        </p:txBody>
+      </p:sp>
+      <p:sp>
+        <p:nvSpPr>
+          <p:cNvPr id="50" name="正方形/長方形 49">
+            <a:extLst>
+              <a:ext uri="{FF2B5EF4-FFF2-40B4-BE49-F238E27FC236}">
+                <a16:creationId xmlns:a16="http://schemas.microsoft.com/office/drawing/2014/main" id="{D54ECAF1-17E4-BD49-BA7B-A50C5B879BC6}"/>
+              </a:ext>
+            </a:extLst>
+          </p:cNvPr>
+          <p:cNvSpPr/>
+          <p:nvPr/>
+        </p:nvSpPr>
+        <p:spPr>
+          <a:xfrm>
+            <a:off x="1284563" y="5793346"/>
+            <a:ext cx="4113003" cy="107575"/>
+          </a:xfrm>
+          <a:prstGeom prst="rect">
+            <a:avLst/>
+          </a:prstGeom>
+          <a:noFill/>
+        </p:spPr>
+        <p:style>
+          <a:lnRef idx="2">
+            <a:schemeClr val="accent1">
+              <a:shade val="50000"/>
+            </a:schemeClr>
+          </a:lnRef>
+          <a:fillRef idx="1">
+            <a:schemeClr val="accent1"/>
+          </a:fillRef>
+          <a:effectRef idx="0">
+            <a:schemeClr val="accent1"/>
+          </a:effectRef>
+          <a:fontRef idx="minor">
+            <a:schemeClr val="lt1"/>
+          </a:fontRef>
+        </p:style>
+        <p:txBody>
+          <a:bodyPr rtlCol="0" anchor="ctr"/>
+          <a:lstStyle/>
+          <a:p>
+            <a:pPr algn="ctr"/>
+            <a:endParaRPr kumimoji="1" lang="ja-JP" altLang="en-US"/>
+          </a:p>
+        </p:txBody>
+      </p:sp>
+      <p:sp>
+        <p:nvSpPr>
+          <p:cNvPr id="44" name="右矢印 43">
+            <a:extLst>
+              <a:ext uri="{FF2B5EF4-FFF2-40B4-BE49-F238E27FC236}">
+                <a16:creationId xmlns:a16="http://schemas.microsoft.com/office/drawing/2014/main" id="{DFAE1675-EF74-A94D-8785-EC33A7BF74E5}"/>
+              </a:ext>
+            </a:extLst>
+          </p:cNvPr>
+          <p:cNvSpPr/>
+          <p:nvPr/>
+        </p:nvSpPr>
+        <p:spPr>
+          <a:xfrm>
+            <a:off x="7296665" y="1282766"/>
+            <a:ext cx="253313" cy="224801"/>
+          </a:xfrm>
+          <a:prstGeom prst="rightArrow">
+            <a:avLst/>
+          </a:prstGeom>
+        </p:spPr>
+        <p:style>
+          <a:lnRef idx="2">
+            <a:schemeClr val="accent1">
+              <a:shade val="50000"/>
+            </a:schemeClr>
+          </a:lnRef>
+          <a:fillRef idx="1">
+            <a:schemeClr val="accent1"/>
+          </a:fillRef>
+          <a:effectRef idx="0">
+            <a:schemeClr val="accent1"/>
+          </a:effectRef>
+          <a:fontRef idx="minor">
+            <a:schemeClr val="lt1"/>
+          </a:fontRef>
+        </p:style>
+        <p:txBody>
+          <a:bodyPr rtlCol="0" anchor="ctr"/>
+          <a:lstStyle/>
+          <a:p>
+            <a:pPr algn="ctr"/>
+            <a:endParaRPr kumimoji="1" lang="ja-JP" altLang="en-US"/>
+          </a:p>
+        </p:txBody>
+      </p:sp>
+      <p:sp>
+        <p:nvSpPr>
+          <p:cNvPr id="52" name="右矢印 51">
+            <a:extLst>
+              <a:ext uri="{FF2B5EF4-FFF2-40B4-BE49-F238E27FC236}">
+                <a16:creationId xmlns:a16="http://schemas.microsoft.com/office/drawing/2014/main" id="{3B3E1EB4-61A3-6146-9D6E-DCAFAC4C1BA3}"/>
+              </a:ext>
+            </a:extLst>
+          </p:cNvPr>
+          <p:cNvSpPr/>
+          <p:nvPr/>
+        </p:nvSpPr>
+        <p:spPr>
+          <a:xfrm>
+            <a:off x="7296665" y="1681994"/>
+            <a:ext cx="253313" cy="224801"/>
+          </a:xfrm>
+          <a:prstGeom prst="rightArrow">
+            <a:avLst/>
+          </a:prstGeom>
+        </p:spPr>
+        <p:style>
+          <a:lnRef idx="2">
+            <a:schemeClr val="accent1">
+              <a:shade val="50000"/>
+            </a:schemeClr>
+          </a:lnRef>
+          <a:fillRef idx="1">
+            <a:schemeClr val="accent1"/>
+          </a:fillRef>
+          <a:effectRef idx="0">
+            <a:schemeClr val="accent1"/>
+          </a:effectRef>
+          <a:fontRef idx="minor">
+            <a:schemeClr val="lt1"/>
+          </a:fontRef>
+        </p:style>
+        <p:txBody>
+          <a:bodyPr rtlCol="0" anchor="ctr"/>
+          <a:lstStyle/>
+          <a:p>
+            <a:pPr algn="ctr"/>
+            <a:endParaRPr kumimoji="1" lang="ja-JP" altLang="en-US"/>
+          </a:p>
+        </p:txBody>
+      </p:sp>
+      <p:sp>
+        <p:nvSpPr>
+          <p:cNvPr id="53" name="右矢印 52">
+            <a:extLst>
+              <a:ext uri="{FF2B5EF4-FFF2-40B4-BE49-F238E27FC236}">
+                <a16:creationId xmlns:a16="http://schemas.microsoft.com/office/drawing/2014/main" id="{0224F488-6D22-E84E-920E-6754F1D82776}"/>
+              </a:ext>
+            </a:extLst>
+          </p:cNvPr>
+          <p:cNvSpPr/>
+          <p:nvPr/>
+        </p:nvSpPr>
+        <p:spPr>
+          <a:xfrm>
+            <a:off x="6159271" y="3177642"/>
+            <a:ext cx="253313" cy="224801"/>
+          </a:xfrm>
+          <a:prstGeom prst="rightArrow">
+            <a:avLst/>
+          </a:prstGeom>
+        </p:spPr>
+        <p:style>
+          <a:lnRef idx="2">
+            <a:schemeClr val="accent1">
+              <a:shade val="50000"/>
+            </a:schemeClr>
+          </a:lnRef>
+          <a:fillRef idx="1">
+            <a:schemeClr val="accent1"/>
+          </a:fillRef>
+          <a:effectRef idx="0">
+            <a:schemeClr val="accent1"/>
+          </a:effectRef>
+          <a:fontRef idx="minor">
+            <a:schemeClr val="lt1"/>
+          </a:fontRef>
+        </p:style>
+        <p:txBody>
+          <a:bodyPr rtlCol="0" anchor="ctr"/>
+          <a:lstStyle/>
+          <a:p>
+            <a:pPr algn="ctr"/>
+            <a:endParaRPr kumimoji="1" lang="ja-JP" altLang="en-US"/>
+          </a:p>
+        </p:txBody>
+      </p:sp>
+      <p:sp>
+        <p:nvSpPr>
+          <p:cNvPr id="54" name="右矢印 53">
+            <a:extLst>
+              <a:ext uri="{FF2B5EF4-FFF2-40B4-BE49-F238E27FC236}">
+                <a16:creationId xmlns:a16="http://schemas.microsoft.com/office/drawing/2014/main" id="{B50B13C3-4F46-1145-A504-AEFB54526324}"/>
+              </a:ext>
+            </a:extLst>
+          </p:cNvPr>
+          <p:cNvSpPr/>
+          <p:nvPr/>
+        </p:nvSpPr>
+        <p:spPr>
+          <a:xfrm>
+            <a:off x="7296664" y="4684795"/>
+            <a:ext cx="253313" cy="224801"/>
+          </a:xfrm>
+          <a:prstGeom prst="rightArrow">
+            <a:avLst/>
+          </a:prstGeom>
+        </p:spPr>
+        <p:style>
+          <a:lnRef idx="2">
+            <a:schemeClr val="accent1">
+              <a:shade val="50000"/>
+            </a:schemeClr>
+          </a:lnRef>
+          <a:fillRef idx="1">
+            <a:schemeClr val="accent1"/>
+          </a:fillRef>
+          <a:effectRef idx="0">
+            <a:schemeClr val="accent1"/>
+          </a:effectRef>
+          <a:fontRef idx="minor">
+            <a:schemeClr val="lt1"/>
+          </a:fontRef>
+        </p:style>
+        <p:txBody>
+          <a:bodyPr rtlCol="0" anchor="ctr"/>
+          <a:lstStyle/>
+          <a:p>
+            <a:pPr algn="ctr"/>
+            <a:endParaRPr kumimoji="1" lang="ja-JP" altLang="en-US"/>
+          </a:p>
+        </p:txBody>
+      </p:sp>
+      <p:sp>
+        <p:nvSpPr>
+          <p:cNvPr id="55" name="右矢印 54">
+            <a:extLst>
+              <a:ext uri="{FF2B5EF4-FFF2-40B4-BE49-F238E27FC236}">
+                <a16:creationId xmlns:a16="http://schemas.microsoft.com/office/drawing/2014/main" id="{1CB2FF2A-2F43-D140-980A-B139B1F81266}"/>
+              </a:ext>
+            </a:extLst>
+          </p:cNvPr>
+          <p:cNvSpPr/>
+          <p:nvPr/>
+        </p:nvSpPr>
+        <p:spPr>
+          <a:xfrm>
+            <a:off x="7417140" y="2295539"/>
+            <a:ext cx="165772" cy="125516"/>
+          </a:xfrm>
+          <a:prstGeom prst="rightArrow">
+            <a:avLst/>
+          </a:prstGeom>
+        </p:spPr>
+        <p:style>
+          <a:lnRef idx="2">
+            <a:schemeClr val="accent1">
+              <a:shade val="50000"/>
+            </a:schemeClr>
+          </a:lnRef>
+          <a:fillRef idx="1">
+            <a:schemeClr val="accent1"/>
+          </a:fillRef>
+          <a:effectRef idx="0">
+            <a:schemeClr val="accent1"/>
+          </a:effectRef>
+          <a:fontRef idx="minor">
+            <a:schemeClr val="lt1"/>
+          </a:fontRef>
+        </p:style>
+        <p:txBody>
+          <a:bodyPr rtlCol="0" anchor="ctr"/>
+          <a:lstStyle/>
+          <a:p>
+            <a:pPr algn="ctr"/>
+            <a:endParaRPr kumimoji="1" lang="ja-JP" altLang="en-US"/>
+          </a:p>
+        </p:txBody>
+      </p:sp>
+      <p:sp>
+        <p:nvSpPr>
+          <p:cNvPr id="56" name="右矢印 55">
+            <a:extLst>
+              <a:ext uri="{FF2B5EF4-FFF2-40B4-BE49-F238E27FC236}">
+                <a16:creationId xmlns:a16="http://schemas.microsoft.com/office/drawing/2014/main" id="{7D59B850-8405-BF4C-95A0-C7ADBC118F05}"/>
+              </a:ext>
+            </a:extLst>
+          </p:cNvPr>
+          <p:cNvSpPr/>
+          <p:nvPr/>
+        </p:nvSpPr>
+        <p:spPr>
+          <a:xfrm>
+            <a:off x="7417140" y="2826208"/>
+            <a:ext cx="165772" cy="125516"/>
+          </a:xfrm>
+          <a:prstGeom prst="rightArrow">
+            <a:avLst/>
+          </a:prstGeom>
+        </p:spPr>
+        <p:style>
+          <a:lnRef idx="2">
+            <a:schemeClr val="accent1">
+              <a:shade val="50000"/>
+            </a:schemeClr>
+          </a:lnRef>
+          <a:fillRef idx="1">
+            <a:schemeClr val="accent1"/>
+          </a:fillRef>
+          <a:effectRef idx="0">
+            <a:schemeClr val="accent1"/>
+          </a:effectRef>
+          <a:fontRef idx="minor">
+            <a:schemeClr val="lt1"/>
+          </a:fontRef>
+        </p:style>
+        <p:txBody>
+          <a:bodyPr rtlCol="0" anchor="ctr"/>
+          <a:lstStyle/>
+          <a:p>
+            <a:pPr algn="ctr"/>
+            <a:endParaRPr kumimoji="1" lang="ja-JP" altLang="en-US"/>
+          </a:p>
+        </p:txBody>
+      </p:sp>
+      <p:sp>
+        <p:nvSpPr>
+          <p:cNvPr id="57" name="右矢印 56">
+            <a:extLst>
+              <a:ext uri="{FF2B5EF4-FFF2-40B4-BE49-F238E27FC236}">
+                <a16:creationId xmlns:a16="http://schemas.microsoft.com/office/drawing/2014/main" id="{467A55E4-749A-E642-8FFE-6619D889AA17}"/>
+              </a:ext>
+            </a:extLst>
+          </p:cNvPr>
+          <p:cNvSpPr/>
+          <p:nvPr/>
+        </p:nvSpPr>
+        <p:spPr>
+          <a:xfrm>
+            <a:off x="7417140" y="3285395"/>
+            <a:ext cx="165772" cy="125516"/>
+          </a:xfrm>
+          <a:prstGeom prst="rightArrow">
+            <a:avLst/>
+          </a:prstGeom>
+        </p:spPr>
+        <p:style>
+          <a:lnRef idx="2">
+            <a:schemeClr val="accent1">
+              <a:shade val="50000"/>
+            </a:schemeClr>
+          </a:lnRef>
+          <a:fillRef idx="1">
+            <a:schemeClr val="accent1"/>
+          </a:fillRef>
+          <a:effectRef idx="0">
+            <a:schemeClr val="accent1"/>
+          </a:effectRef>
+          <a:fontRef idx="minor">
+            <a:schemeClr val="lt1"/>
+          </a:fontRef>
+        </p:style>
+        <p:txBody>
+          <a:bodyPr rtlCol="0" anchor="ctr"/>
+          <a:lstStyle/>
+          <a:p>
+            <a:pPr algn="ctr"/>
+            <a:endParaRPr kumimoji="1" lang="ja-JP" altLang="en-US"/>
+          </a:p>
+        </p:txBody>
+      </p:sp>
+      <p:sp>
+        <p:nvSpPr>
+          <p:cNvPr id="58" name="右矢印 57">
+            <a:extLst>
+              <a:ext uri="{FF2B5EF4-FFF2-40B4-BE49-F238E27FC236}">
+                <a16:creationId xmlns:a16="http://schemas.microsoft.com/office/drawing/2014/main" id="{FF12B041-391F-8D47-BC6B-4ACDD35ADE08}"/>
+              </a:ext>
+            </a:extLst>
+          </p:cNvPr>
+          <p:cNvSpPr/>
+          <p:nvPr/>
+        </p:nvSpPr>
+        <p:spPr>
+          <a:xfrm>
+            <a:off x="7417140" y="3769331"/>
+            <a:ext cx="165772" cy="125516"/>
+          </a:xfrm>
+          <a:prstGeom prst="rightArrow">
+            <a:avLst/>
+          </a:prstGeom>
+        </p:spPr>
+        <p:style>
+          <a:lnRef idx="2">
+            <a:schemeClr val="accent1">
+              <a:shade val="50000"/>
+            </a:schemeClr>
+          </a:lnRef>
+          <a:fillRef idx="1">
+            <a:schemeClr val="accent1"/>
+          </a:fillRef>
+          <a:effectRef idx="0">
+            <a:schemeClr val="accent1"/>
+          </a:effectRef>
+          <a:fontRef idx="minor">
+            <a:schemeClr val="lt1"/>
+          </a:fontRef>
+        </p:style>
+        <p:txBody>
+          <a:bodyPr rtlCol="0" anchor="ctr"/>
+          <a:lstStyle/>
+          <a:p>
+            <a:pPr algn="ctr"/>
+            <a:endParaRPr kumimoji="1" lang="ja-JP" altLang="en-US"/>
+          </a:p>
+        </p:txBody>
+      </p:sp>
+      <p:sp>
+        <p:nvSpPr>
+          <p:cNvPr id="59" name="右矢印 58">
+            <a:extLst>
+              <a:ext uri="{FF2B5EF4-FFF2-40B4-BE49-F238E27FC236}">
+                <a16:creationId xmlns:a16="http://schemas.microsoft.com/office/drawing/2014/main" id="{84FF56D4-F08D-7344-9B77-13E4604E3B0A}"/>
+              </a:ext>
+            </a:extLst>
+          </p:cNvPr>
+          <p:cNvSpPr/>
+          <p:nvPr/>
+        </p:nvSpPr>
+        <p:spPr>
+          <a:xfrm>
+            <a:off x="7417140" y="4275663"/>
+            <a:ext cx="165772" cy="125516"/>
+          </a:xfrm>
+          <a:prstGeom prst="rightArrow">
+            <a:avLst/>
+          </a:prstGeom>
+        </p:spPr>
+        <p:style>
+          <a:lnRef idx="2">
+            <a:schemeClr val="accent1">
+              <a:shade val="50000"/>
+            </a:schemeClr>
+          </a:lnRef>
+          <a:fillRef idx="1">
+            <a:schemeClr val="accent1"/>
+          </a:fillRef>
+          <a:effectRef idx="0">
+            <a:schemeClr val="accent1"/>
+          </a:effectRef>
+          <a:fontRef idx="minor">
+            <a:schemeClr val="lt1"/>
+          </a:fontRef>
+        </p:style>
+        <p:txBody>
+          <a:bodyPr rtlCol="0" anchor="ctr"/>
+          <a:lstStyle/>
+          <a:p>
+            <a:pPr algn="ctr"/>
+            <a:endParaRPr kumimoji="1" lang="ja-JP" altLang="en-US"/>
+          </a:p>
+        </p:txBody>
+      </p:sp>
+      <p:grpSp>
+        <p:nvGrpSpPr>
+          <p:cNvPr id="62" name="グループ化 61">
+            <a:extLst>
+              <a:ext uri="{FF2B5EF4-FFF2-40B4-BE49-F238E27FC236}">
+                <a16:creationId xmlns:a16="http://schemas.microsoft.com/office/drawing/2014/main" id="{F21D7E6D-3431-544C-A7F1-AA0CC3B3778A}"/>
+              </a:ext>
+            </a:extLst>
+          </p:cNvPr>
+          <p:cNvGrpSpPr/>
+          <p:nvPr/>
+        </p:nvGrpSpPr>
+        <p:grpSpPr>
+          <a:xfrm>
+            <a:off x="5563088" y="5261371"/>
+            <a:ext cx="6567515" cy="708873"/>
+            <a:chOff x="279069" y="5436608"/>
+            <a:chExt cx="12235844" cy="708873"/>
+          </a:xfrm>
+        </p:grpSpPr>
+        <p:sp>
+          <p:nvSpPr>
+            <p:cNvPr id="63" name="正方形/長方形 62">
+              <a:extLst>
+                <a:ext uri="{FF2B5EF4-FFF2-40B4-BE49-F238E27FC236}">
+                  <a16:creationId xmlns:a16="http://schemas.microsoft.com/office/drawing/2014/main" id="{3471DA5B-7B57-0049-B5B1-1BB3410E6165}"/>
+                </a:ext>
+              </a:extLst>
+            </p:cNvPr>
+            <p:cNvSpPr/>
+            <p:nvPr/>
+          </p:nvSpPr>
+          <p:spPr>
+            <a:xfrm>
+              <a:off x="279069" y="5436608"/>
+              <a:ext cx="11955025" cy="708873"/>
+            </a:xfrm>
+            <a:prstGeom prst="rect">
+              <a:avLst/>
+            </a:prstGeom>
+            <a:solidFill>
+              <a:schemeClr val="accent1">
+                <a:alpha val="50000"/>
+              </a:schemeClr>
+            </a:solidFill>
+            <a:ln>
               <a:noFill/>
-            </p:spPr>
-            <p:txBody>
-              <a:bodyPr wrap="none" lIns="0" tIns="0" rIns="0" bIns="0" rtlCol="0">
-                <a:spAutoFit/>
-              </a:bodyPr>
-              <a:lstStyle/>
-              <a:p>
-                <a14:m>
-                  <m:oMathPara xmlns:m="http://schemas.openxmlformats.org/officeDocument/2006/math">
-                    <m:oMathParaPr>
-                      <m:jc m:val="centerGroup"/>
-                    </m:oMathParaPr>
-                    <m:oMath xmlns:m="http://schemas.openxmlformats.org/officeDocument/2006/math">
-                      <m:d>
-                        <m:dPr>
-                          <m:ctrlPr>
-                            <a:rPr lang="en-US" altLang="ja-JP" i="1" smtClean="0">
-                              <a:latin typeface="Cambria Math" panose="02040503050406030204" pitchFamily="18" charset="0"/>
-                            </a:rPr>
-                          </m:ctrlPr>
-                        </m:dPr>
-                        <m:e>
-                          <m:r>
-                            <a:rPr lang="en-US" altLang="ja-JP" b="0" i="1" smtClean="0">
-                              <a:latin typeface="Cambria Math" panose="02040503050406030204" pitchFamily="18" charset="0"/>
-                            </a:rPr>
-                            <m:t>𝑥</m:t>
-                          </m:r>
-                          <m:r>
-                            <a:rPr lang="en-US" altLang="ja-JP" b="0" i="1" smtClean="0">
-                              <a:latin typeface="Cambria Math" panose="02040503050406030204" pitchFamily="18" charset="0"/>
-                            </a:rPr>
-                            <m:t>11 </m:t>
-                          </m:r>
-                          <m:r>
-                            <a:rPr lang="en-US" altLang="ja-JP" b="0" i="1" smtClean="0">
-                              <a:latin typeface="Cambria Math" panose="02040503050406030204" pitchFamily="18" charset="0"/>
-                            </a:rPr>
-                            <m:t>𝑥</m:t>
-                          </m:r>
-                          <m:r>
-                            <a:rPr lang="en-US" altLang="ja-JP" b="0" i="1" smtClean="0">
-                              <a:latin typeface="Cambria Math" panose="02040503050406030204" pitchFamily="18" charset="0"/>
-                            </a:rPr>
-                            <m:t>12</m:t>
-                          </m:r>
-                        </m:e>
-                      </m:d>
-                      <m:r>
-                        <a:rPr lang="en-US" altLang="ja-JP" b="0" i="1" smtClean="0">
-                          <a:latin typeface="Cambria Math" panose="02040503050406030204" pitchFamily="18" charset="0"/>
-                        </a:rPr>
-                        <m:t>∗</m:t>
-                      </m:r>
-                      <m:d>
-                        <m:dPr>
-                          <m:ctrlPr>
-                            <a:rPr lang="en-US" altLang="ja-JP" i="1">
-                              <a:latin typeface="Cambria Math" panose="02040503050406030204" pitchFamily="18" charset="0"/>
-                            </a:rPr>
-                          </m:ctrlPr>
-                        </m:dPr>
-                        <m:e>
-                          <m:eqArr>
-                            <m:eqArrPr>
-                              <m:ctrlPr>
-                                <a:rPr lang="en-US" altLang="ja-JP" i="1">
-                                  <a:latin typeface="Cambria Math" panose="02040503050406030204" pitchFamily="18" charset="0"/>
-                                </a:rPr>
-                              </m:ctrlPr>
-                            </m:eqArrPr>
-                            <m:e>
-                              <m:r>
-                                <a:rPr lang="en-US" altLang="ja-JP" i="1">
-                                  <a:latin typeface="Cambria Math" panose="02040503050406030204" pitchFamily="18" charset="0"/>
-                                </a:rPr>
-                                <m:t>𝑤</m:t>
-                              </m:r>
-                              <m:r>
-                                <a:rPr lang="en-US" altLang="ja-JP" i="1">
-                                  <a:latin typeface="Cambria Math" panose="02040503050406030204" pitchFamily="18" charset="0"/>
-                                </a:rPr>
-                                <m:t>11 </m:t>
-                              </m:r>
-                              <m:r>
-                                <a:rPr lang="en-US" altLang="ja-JP" i="1">
-                                  <a:latin typeface="Cambria Math" panose="02040503050406030204" pitchFamily="18" charset="0"/>
-                                </a:rPr>
-                                <m:t>𝑤</m:t>
-                              </m:r>
-                              <m:r>
-                                <a:rPr lang="en-US" altLang="ja-JP" i="1">
-                                  <a:latin typeface="Cambria Math" panose="02040503050406030204" pitchFamily="18" charset="0"/>
-                                </a:rPr>
-                                <m:t>21 </m:t>
-                              </m:r>
-                              <m:r>
-                                <a:rPr lang="en-US" altLang="ja-JP" i="1">
-                                  <a:latin typeface="Cambria Math" panose="02040503050406030204" pitchFamily="18" charset="0"/>
-                                </a:rPr>
-                                <m:t>𝑤</m:t>
-                              </m:r>
-                              <m:r>
-                                <a:rPr lang="en-US" altLang="ja-JP" i="1">
-                                  <a:latin typeface="Cambria Math" panose="02040503050406030204" pitchFamily="18" charset="0"/>
-                                </a:rPr>
-                                <m:t>31 </m:t>
-                              </m:r>
-                              <m:r>
-                                <a:rPr lang="en-US" altLang="ja-JP" i="1">
-                                  <a:latin typeface="Cambria Math" panose="02040503050406030204" pitchFamily="18" charset="0"/>
-                                </a:rPr>
-                                <m:t>𝑤</m:t>
-                              </m:r>
-                              <m:r>
-                                <a:rPr lang="en-US" altLang="ja-JP" i="1">
-                                  <a:latin typeface="Cambria Math" panose="02040503050406030204" pitchFamily="18" charset="0"/>
-                                </a:rPr>
-                                <m:t>41 </m:t>
-                              </m:r>
-                              <m:r>
-                                <a:rPr lang="en-US" altLang="ja-JP" i="1">
-                                  <a:latin typeface="Cambria Math" panose="02040503050406030204" pitchFamily="18" charset="0"/>
-                                </a:rPr>
-                                <m:t>𝑤</m:t>
-                              </m:r>
-                              <m:r>
-                                <a:rPr lang="en-US" altLang="ja-JP" i="1">
-                                  <a:latin typeface="Cambria Math" panose="02040503050406030204" pitchFamily="18" charset="0"/>
-                                </a:rPr>
-                                <m:t>51 </m:t>
-                              </m:r>
-                              <m:r>
-                                <a:rPr lang="en-US" altLang="ja-JP" i="1">
-                                  <a:latin typeface="Cambria Math" panose="02040503050406030204" pitchFamily="18" charset="0"/>
-                                </a:rPr>
-                                <m:t>𝑤</m:t>
-                              </m:r>
-                              <m:r>
-                                <a:rPr lang="en-US" altLang="ja-JP" i="1">
-                                  <a:latin typeface="Cambria Math" panose="02040503050406030204" pitchFamily="18" charset="0"/>
-                                </a:rPr>
-                                <m:t>61 </m:t>
-                              </m:r>
-                              <m:r>
-                                <a:rPr lang="en-US" altLang="ja-JP" i="1">
-                                  <a:latin typeface="Cambria Math" panose="02040503050406030204" pitchFamily="18" charset="0"/>
-                                </a:rPr>
-                                <m:t>𝑤</m:t>
-                              </m:r>
-                              <m:r>
-                                <a:rPr lang="en-US" altLang="ja-JP" i="1">
-                                  <a:latin typeface="Cambria Math" panose="02040503050406030204" pitchFamily="18" charset="0"/>
-                                </a:rPr>
-                                <m:t>71 </m:t>
-                              </m:r>
-                              <m:r>
-                                <a:rPr lang="en-US" altLang="ja-JP" i="1">
-                                  <a:latin typeface="Cambria Math" panose="02040503050406030204" pitchFamily="18" charset="0"/>
-                                </a:rPr>
-                                <m:t>𝑤</m:t>
-                              </m:r>
-                              <m:r>
-                                <a:rPr lang="en-US" altLang="ja-JP" i="1">
-                                  <a:latin typeface="Cambria Math" panose="02040503050406030204" pitchFamily="18" charset="0"/>
-                                </a:rPr>
-                                <m:t>81</m:t>
-                              </m:r>
-                            </m:e>
-                            <m:e>
-                              <m:r>
-                                <a:rPr lang="en-US" altLang="ja-JP" i="1">
-                                  <a:latin typeface="Cambria Math" panose="02040503050406030204" pitchFamily="18" charset="0"/>
-                                </a:rPr>
-                                <m:t>𝑤</m:t>
-                              </m:r>
-                              <m:r>
-                                <a:rPr lang="en-US" altLang="ja-JP" i="1">
-                                  <a:latin typeface="Cambria Math" panose="02040503050406030204" pitchFamily="18" charset="0"/>
-                                </a:rPr>
-                                <m:t>12 </m:t>
-                              </m:r>
-                              <m:r>
-                                <a:rPr lang="en-US" altLang="ja-JP" i="1">
-                                  <a:latin typeface="Cambria Math" panose="02040503050406030204" pitchFamily="18" charset="0"/>
-                                </a:rPr>
-                                <m:t>𝑤</m:t>
-                              </m:r>
-                              <m:r>
-                                <a:rPr lang="en-US" altLang="ja-JP" i="1">
-                                  <a:latin typeface="Cambria Math" panose="02040503050406030204" pitchFamily="18" charset="0"/>
-                                </a:rPr>
-                                <m:t>22 </m:t>
-                              </m:r>
-                              <m:r>
-                                <a:rPr lang="en-US" altLang="ja-JP" i="1">
-                                  <a:latin typeface="Cambria Math" panose="02040503050406030204" pitchFamily="18" charset="0"/>
-                                </a:rPr>
-                                <m:t>𝑤</m:t>
-                              </m:r>
-                              <m:r>
-                                <a:rPr lang="en-US" altLang="ja-JP" i="1">
-                                  <a:latin typeface="Cambria Math" panose="02040503050406030204" pitchFamily="18" charset="0"/>
-                                </a:rPr>
-                                <m:t>32 </m:t>
-                              </m:r>
-                              <m:r>
-                                <a:rPr lang="en-US" altLang="ja-JP" i="1">
-                                  <a:latin typeface="Cambria Math" panose="02040503050406030204" pitchFamily="18" charset="0"/>
-                                </a:rPr>
-                                <m:t>𝑤</m:t>
-                              </m:r>
-                              <m:r>
-                                <a:rPr lang="en-US" altLang="ja-JP" i="1">
-                                  <a:latin typeface="Cambria Math" panose="02040503050406030204" pitchFamily="18" charset="0"/>
-                                </a:rPr>
-                                <m:t>42 </m:t>
-                              </m:r>
-                              <m:r>
-                                <a:rPr lang="en-US" altLang="ja-JP" i="1">
-                                  <a:latin typeface="Cambria Math" panose="02040503050406030204" pitchFamily="18" charset="0"/>
-                                </a:rPr>
-                                <m:t>𝑤</m:t>
-                              </m:r>
-                              <m:r>
-                                <a:rPr lang="en-US" altLang="ja-JP" i="1">
-                                  <a:latin typeface="Cambria Math" panose="02040503050406030204" pitchFamily="18" charset="0"/>
-                                </a:rPr>
-                                <m:t>52 </m:t>
-                              </m:r>
-                              <m:r>
-                                <a:rPr lang="en-US" altLang="ja-JP" i="1">
-                                  <a:latin typeface="Cambria Math" panose="02040503050406030204" pitchFamily="18" charset="0"/>
-                                </a:rPr>
-                                <m:t>𝑤</m:t>
-                              </m:r>
-                              <m:r>
-                                <a:rPr lang="en-US" altLang="ja-JP" i="1">
-                                  <a:latin typeface="Cambria Math" panose="02040503050406030204" pitchFamily="18" charset="0"/>
-                                </a:rPr>
-                                <m:t>62 </m:t>
-                              </m:r>
-                              <m:r>
-                                <a:rPr lang="en-US" altLang="ja-JP" i="1">
-                                  <a:latin typeface="Cambria Math" panose="02040503050406030204" pitchFamily="18" charset="0"/>
-                                </a:rPr>
-                                <m:t>𝑤</m:t>
-                              </m:r>
-                              <m:r>
-                                <a:rPr lang="en-US" altLang="ja-JP" i="1">
-                                  <a:latin typeface="Cambria Math" panose="02040503050406030204" pitchFamily="18" charset="0"/>
-                                </a:rPr>
-                                <m:t>72 </m:t>
-                              </m:r>
-                              <m:r>
-                                <a:rPr lang="en-US" altLang="ja-JP" i="1">
-                                  <a:latin typeface="Cambria Math" panose="02040503050406030204" pitchFamily="18" charset="0"/>
-                                </a:rPr>
-                                <m:t>𝑤</m:t>
-                              </m:r>
-                              <m:r>
-                                <a:rPr lang="en-US" altLang="ja-JP" i="1">
-                                  <a:latin typeface="Cambria Math" panose="02040503050406030204" pitchFamily="18" charset="0"/>
-                                </a:rPr>
-                                <m:t>82</m:t>
-                              </m:r>
-                            </m:e>
-                          </m:eqArr>
-                        </m:e>
-                      </m:d>
-                      <m:r>
-                        <a:rPr lang="en-US" altLang="ja-JP" b="0" i="1" smtClean="0">
-                          <a:latin typeface="Cambria Math" panose="02040503050406030204" pitchFamily="18" charset="0"/>
-                        </a:rPr>
-                        <m:t>+</m:t>
-                      </m:r>
-                      <m:d>
-                        <m:dPr>
-                          <m:ctrlPr>
-                            <a:rPr lang="en-US" altLang="ja-JP" i="1" smtClean="0">
-                              <a:latin typeface="Cambria Math" panose="02040503050406030204" pitchFamily="18" charset="0"/>
-                            </a:rPr>
-                          </m:ctrlPr>
-                        </m:dPr>
-                        <m:e>
-                          <m:r>
-                            <a:rPr lang="en-US" altLang="ja-JP" b="0" i="1" smtClean="0">
-                              <a:latin typeface="Cambria Math" panose="02040503050406030204" pitchFamily="18" charset="0"/>
-                            </a:rPr>
-                            <m:t>𝑏</m:t>
-                          </m:r>
-                          <m:r>
-                            <a:rPr lang="en-US" altLang="ja-JP" b="0" i="1" smtClean="0">
-                              <a:latin typeface="Cambria Math" panose="02040503050406030204" pitchFamily="18" charset="0"/>
-                            </a:rPr>
-                            <m:t>11 </m:t>
-                          </m:r>
-                          <m:r>
-                            <a:rPr lang="en-US" altLang="ja-JP" b="0" i="1" smtClean="0">
-                              <a:latin typeface="Cambria Math" panose="02040503050406030204" pitchFamily="18" charset="0"/>
-                            </a:rPr>
-                            <m:t>𝑏</m:t>
-                          </m:r>
-                          <m:r>
-                            <a:rPr lang="en-US" altLang="ja-JP" b="0" i="1" smtClean="0">
-                              <a:latin typeface="Cambria Math" panose="02040503050406030204" pitchFamily="18" charset="0"/>
-                            </a:rPr>
-                            <m:t>12 </m:t>
-                          </m:r>
-                          <m:r>
-                            <a:rPr lang="en-US" altLang="ja-JP" b="0" i="1" smtClean="0">
-                              <a:latin typeface="Cambria Math" panose="02040503050406030204" pitchFamily="18" charset="0"/>
-                            </a:rPr>
-                            <m:t>𝑏</m:t>
-                          </m:r>
-                          <m:r>
-                            <a:rPr lang="en-US" altLang="ja-JP" b="0" i="1" smtClean="0">
-                              <a:latin typeface="Cambria Math" panose="02040503050406030204" pitchFamily="18" charset="0"/>
-                            </a:rPr>
-                            <m:t>13 </m:t>
-                          </m:r>
-                          <m:r>
-                            <a:rPr lang="en-US" altLang="ja-JP" b="0" i="1" smtClean="0">
-                              <a:latin typeface="Cambria Math" panose="02040503050406030204" pitchFamily="18" charset="0"/>
-                            </a:rPr>
-                            <m:t>𝑏</m:t>
-                          </m:r>
-                          <m:r>
-                            <a:rPr lang="en-US" altLang="ja-JP" b="0" i="1" smtClean="0">
-                              <a:latin typeface="Cambria Math" panose="02040503050406030204" pitchFamily="18" charset="0"/>
-                            </a:rPr>
-                            <m:t>14 </m:t>
-                          </m:r>
-                          <m:r>
-                            <a:rPr lang="en-US" altLang="ja-JP" b="0" i="1" smtClean="0">
-                              <a:latin typeface="Cambria Math" panose="02040503050406030204" pitchFamily="18" charset="0"/>
-                            </a:rPr>
-                            <m:t>𝑏</m:t>
-                          </m:r>
-                          <m:r>
-                            <a:rPr lang="en-US" altLang="ja-JP" b="0" i="1" smtClean="0">
-                              <a:latin typeface="Cambria Math" panose="02040503050406030204" pitchFamily="18" charset="0"/>
-                            </a:rPr>
-                            <m:t>15 </m:t>
-                          </m:r>
-                          <m:r>
-                            <a:rPr lang="en-US" altLang="ja-JP" b="0" i="1" smtClean="0">
-                              <a:latin typeface="Cambria Math" panose="02040503050406030204" pitchFamily="18" charset="0"/>
-                            </a:rPr>
-                            <m:t>𝑏</m:t>
-                          </m:r>
-                          <m:r>
-                            <a:rPr lang="en-US" altLang="ja-JP" b="0" i="1" smtClean="0">
-                              <a:latin typeface="Cambria Math" panose="02040503050406030204" pitchFamily="18" charset="0"/>
-                            </a:rPr>
-                            <m:t>16 17 </m:t>
-                          </m:r>
-                          <m:r>
-                            <a:rPr lang="en-US" altLang="ja-JP" b="0" i="1" smtClean="0">
-                              <a:latin typeface="Cambria Math" panose="02040503050406030204" pitchFamily="18" charset="0"/>
-                            </a:rPr>
-                            <m:t>𝑏</m:t>
-                          </m:r>
-                          <m:r>
-                            <a:rPr lang="en-US" altLang="ja-JP" b="0" i="1" smtClean="0">
-                              <a:latin typeface="Cambria Math" panose="02040503050406030204" pitchFamily="18" charset="0"/>
-                            </a:rPr>
-                            <m:t>18</m:t>
-                          </m:r>
-                        </m:e>
-                      </m:d>
-                    </m:oMath>
-                  </m:oMathPara>
-                </a14:m>
-                <a:endParaRPr kumimoji="1" lang="ja-JP" altLang="en-US"/>
-              </a:p>
-            </p:txBody>
-          </p:sp>
-        </mc:Choice>
-        <mc:Fallback>
-          <p:sp>
-            <p:nvSpPr>
-              <p:cNvPr id="2" name="テキスト ボックス 1">
-                <a:extLst>
-                  <a:ext uri="{FF2B5EF4-FFF2-40B4-BE49-F238E27FC236}">
-                    <a16:creationId xmlns:a16="http://schemas.microsoft.com/office/drawing/2014/main" id="{A8EC4A17-B064-3147-A49C-53A273DC077F}"/>
-                  </a:ext>
-                </a:extLst>
-              </p:cNvPr>
-              <p:cNvSpPr txBox="1">
-                <a:spLocks noRot="1" noChangeAspect="1" noMove="1" noResize="1" noEditPoints="1" noAdjustHandles="1" noChangeArrowheads="1" noChangeShapeType="1" noTextEdit="1"/>
-              </p:cNvSpPr>
-              <p:nvPr/>
-            </p:nvSpPr>
-            <p:spPr>
-              <a:xfrm>
-                <a:off x="1201592" y="4874007"/>
-                <a:ext cx="9033307" cy="467564"/>
-              </a:xfrm>
-              <a:prstGeom prst="rect">
-                <a:avLst/>
-              </a:prstGeom>
-              <a:blipFill>
-                <a:blip r:embed="rId2"/>
-                <a:stretch>
-                  <a:fillRect t="-10811" b="-35135"/>
-                </a:stretch>
-              </a:blipFill>
-            </p:spPr>
-            <p:txBody>
-              <a:bodyPr/>
-              <a:lstStyle/>
-              <a:p>
-                <a:r>
-                  <a:rPr lang="ja-JP" altLang="en-US">
-                    <a:noFill/>
-                  </a:rPr>
-                  <a:t> </a:t>
-                </a:r>
-              </a:p>
-            </p:txBody>
-          </p:sp>
-        </mc:Fallback>
-      </mc:AlternateContent>
-      <mc:AlternateContent xmlns:mc="http://schemas.openxmlformats.org/markup-compatibility/2006">
-        <mc:Choice xmlns:a14="http://schemas.microsoft.com/office/drawing/2010/main" Requires="a14">
-          <p:sp>
-            <p:nvSpPr>
-              <p:cNvPr id="3" name="テキスト ボックス 2">
-                <a:extLst>
-                  <a:ext uri="{FF2B5EF4-FFF2-40B4-BE49-F238E27FC236}">
-                    <a16:creationId xmlns:a16="http://schemas.microsoft.com/office/drawing/2014/main" id="{BD290E6E-4459-164F-B859-458485B933E8}"/>
-                  </a:ext>
-                </a:extLst>
-              </p:cNvPr>
-              <p:cNvSpPr txBox="1"/>
-              <p:nvPr/>
-            </p:nvSpPr>
-            <p:spPr>
-              <a:xfrm>
-                <a:off x="2548759" y="4198303"/>
-                <a:ext cx="1318951" cy="276999"/>
-              </a:xfrm>
-              <a:prstGeom prst="rect">
-                <a:avLst/>
-              </a:prstGeom>
-              <a:noFill/>
-            </p:spPr>
-            <p:txBody>
-              <a:bodyPr wrap="none" lIns="0" tIns="0" rIns="0" bIns="0" rtlCol="0">
-                <a:spAutoFit/>
-              </a:bodyPr>
-              <a:lstStyle/>
-              <a:p>
-                <a14:m>
-                  <m:oMathPara xmlns:m="http://schemas.openxmlformats.org/officeDocument/2006/math">
-                    <m:oMathParaPr>
-                      <m:jc m:val="centerGroup"/>
-                    </m:oMathParaPr>
-                    <m:oMath xmlns:m="http://schemas.openxmlformats.org/officeDocument/2006/math">
-                      <m:r>
-                        <a:rPr kumimoji="1" lang="en-US" altLang="ja-JP" b="0" i="1" smtClean="0">
-                          <a:latin typeface="Cambria Math" panose="02040503050406030204" pitchFamily="18" charset="0"/>
-                        </a:rPr>
-                        <m:t>𝑦</m:t>
-                      </m:r>
-                      <m:r>
-                        <a:rPr kumimoji="1" lang="en-US" altLang="ja-JP" b="0" i="1" smtClean="0">
-                          <a:latin typeface="Cambria Math" panose="02040503050406030204" pitchFamily="18" charset="0"/>
-                        </a:rPr>
-                        <m:t>=</m:t>
-                      </m:r>
-                      <m:r>
-                        <a:rPr kumimoji="1" lang="en-US" altLang="ja-JP" b="0" i="1" smtClean="0">
-                          <a:latin typeface="Cambria Math" panose="02040503050406030204" pitchFamily="18" charset="0"/>
-                        </a:rPr>
-                        <m:t>𝑥𝐴𝑇</m:t>
-                      </m:r>
-                      <m:r>
-                        <a:rPr kumimoji="1" lang="en-US" altLang="ja-JP" b="0" i="1" smtClean="0">
-                          <a:latin typeface="Cambria Math" panose="02040503050406030204" pitchFamily="18" charset="0"/>
-                        </a:rPr>
-                        <m:t>+</m:t>
-                      </m:r>
-                      <m:r>
-                        <a:rPr kumimoji="1" lang="en-US" altLang="ja-JP" b="0" i="1" smtClean="0">
-                          <a:latin typeface="Cambria Math" panose="02040503050406030204" pitchFamily="18" charset="0"/>
-                        </a:rPr>
-                        <m:t>𝑏</m:t>
-                      </m:r>
-                    </m:oMath>
-                  </m:oMathPara>
-                </a14:m>
-                <a:endParaRPr kumimoji="1" lang="ja-JP" altLang="en-US"/>
-              </a:p>
-            </p:txBody>
-          </p:sp>
-        </mc:Choice>
-        <mc:Fallback>
-          <p:sp>
-            <p:nvSpPr>
-              <p:cNvPr id="3" name="テキスト ボックス 2">
-                <a:extLst>
-                  <a:ext uri="{FF2B5EF4-FFF2-40B4-BE49-F238E27FC236}">
-                    <a16:creationId xmlns:a16="http://schemas.microsoft.com/office/drawing/2014/main" id="{BD290E6E-4459-164F-B859-458485B933E8}"/>
-                  </a:ext>
-                </a:extLst>
-              </p:cNvPr>
-              <p:cNvSpPr txBox="1">
-                <a:spLocks noRot="1" noChangeAspect="1" noMove="1" noResize="1" noEditPoints="1" noAdjustHandles="1" noChangeArrowheads="1" noChangeShapeType="1" noTextEdit="1"/>
-              </p:cNvSpPr>
-              <p:nvPr/>
-            </p:nvSpPr>
-            <p:spPr>
-              <a:xfrm>
-                <a:off x="2548759" y="4198303"/>
-                <a:ext cx="1318951" cy="276999"/>
-              </a:xfrm>
-              <a:prstGeom prst="rect">
-                <a:avLst/>
-              </a:prstGeom>
-              <a:blipFill>
-                <a:blip r:embed="rId3"/>
-                <a:stretch>
-                  <a:fillRect l="-1905" r="-952" b="-26087"/>
-                </a:stretch>
-              </a:blipFill>
-            </p:spPr>
-            <p:txBody>
-              <a:bodyPr/>
-              <a:lstStyle/>
-              <a:p>
-                <a:r>
-                  <a:rPr lang="ja-JP" altLang="en-US">
-                    <a:noFill/>
-                  </a:rPr>
-                  <a:t> </a:t>
-                </a:r>
-              </a:p>
-            </p:txBody>
-          </p:sp>
-        </mc:Fallback>
-      </mc:AlternateContent>
+            </a:ln>
+          </p:spPr>
+          <p:style>
+            <a:lnRef idx="0">
+              <a:scrgbClr r="0" g="0" b="0"/>
+            </a:lnRef>
+            <a:fillRef idx="0">
+              <a:scrgbClr r="0" g="0" b="0"/>
+            </a:fillRef>
+            <a:effectRef idx="0">
+              <a:scrgbClr r="0" g="0" b="0"/>
+            </a:effectRef>
+            <a:fontRef idx="minor">
+              <a:schemeClr val="lt1"/>
+            </a:fontRef>
+          </p:style>
+          <p:txBody>
+            <a:bodyPr rtlCol="0" anchor="ctr"/>
+            <a:lstStyle/>
+            <a:p>
+              <a:pPr algn="ctr"/>
+              <a:endParaRPr kumimoji="1" lang="ja-JP" altLang="en-US"/>
+            </a:p>
+          </p:txBody>
+        </p:sp>
+        <p:sp>
+          <p:nvSpPr>
+            <p:cNvPr id="64" name="テキスト ボックス 63">
+              <a:extLst>
+                <a:ext uri="{FF2B5EF4-FFF2-40B4-BE49-F238E27FC236}">
+                  <a16:creationId xmlns:a16="http://schemas.microsoft.com/office/drawing/2014/main" id="{79D4E217-2742-8A47-9E06-C3BF21E457A7}"/>
+                </a:ext>
+              </a:extLst>
+            </p:cNvPr>
+            <p:cNvSpPr txBox="1"/>
+            <p:nvPr/>
+          </p:nvSpPr>
+          <p:spPr>
+            <a:xfrm>
+              <a:off x="317318" y="5481092"/>
+              <a:ext cx="12197595" cy="553998"/>
+            </a:xfrm>
+            <a:prstGeom prst="rect">
+              <a:avLst/>
+            </a:prstGeom>
+            <a:noFill/>
+          </p:spPr>
+          <p:txBody>
+            <a:bodyPr wrap="none" rtlCol="0">
+              <a:spAutoFit/>
+            </a:bodyPr>
+            <a:lstStyle/>
+            <a:p>
+              <a:r>
+                <a:rPr lang="en-US" altLang="ja-JP" sz="1600" b="0" i="0" u="none" strike="noStrike" dirty="0" err="1">
+                  <a:solidFill>
+                    <a:srgbClr val="111111"/>
+                  </a:solidFill>
+                  <a:effectLst/>
+                  <a:latin typeface="Times New Roman" panose="02020603050405020304" pitchFamily="18" charset="0"/>
+                  <a:cs typeface="Times New Roman" panose="02020603050405020304" pitchFamily="18" charset="0"/>
+                </a:rPr>
+                <a:t>BatchNorm</a:t>
+              </a:r>
+              <a:r>
+                <a:rPr lang="en-US" altLang="ja-JP" sz="1600" b="0" i="0" u="none" strike="noStrike" dirty="0">
+                  <a:solidFill>
+                    <a:srgbClr val="111111"/>
+                  </a:solidFill>
+                  <a:effectLst/>
+                  <a:latin typeface="Times New Roman" panose="02020603050405020304" pitchFamily="18" charset="0"/>
+                  <a:cs typeface="Times New Roman" panose="02020603050405020304" pitchFamily="18" charset="0"/>
+                </a:rPr>
+                <a:t> = Batch Normalization = </a:t>
+              </a:r>
+              <a:r>
+                <a:rPr lang="ja-JP" altLang="en-US" sz="1600" b="0" i="0" u="none" strike="noStrike">
+                  <a:solidFill>
+                    <a:srgbClr val="111111"/>
+                  </a:solidFill>
+                  <a:effectLst/>
+                  <a:latin typeface="Times New Roman" panose="02020603050405020304" pitchFamily="18" charset="0"/>
+                  <a:cs typeface="Times New Roman" panose="02020603050405020304" pitchFamily="18" charset="0"/>
+                </a:rPr>
+                <a:t>バッチ正規化</a:t>
+              </a:r>
+              <a:endParaRPr lang="en-US" altLang="ja-JP" sz="1600" b="0" i="0" u="none" strike="noStrike" dirty="0">
+                <a:solidFill>
+                  <a:srgbClr val="111111"/>
+                </a:solidFill>
+                <a:effectLst/>
+                <a:latin typeface="Times New Roman" panose="02020603050405020304" pitchFamily="18" charset="0"/>
+                <a:cs typeface="Times New Roman" panose="02020603050405020304" pitchFamily="18" charset="0"/>
+              </a:endParaRPr>
+            </a:p>
+            <a:p>
+              <a:r>
+                <a:rPr lang="ja-JP" altLang="en-US" sz="1400" b="0" i="0" u="none" strike="noStrike">
+                  <a:solidFill>
+                    <a:srgbClr val="111111"/>
+                  </a:solidFill>
+                  <a:effectLst/>
+                  <a:latin typeface="Times New Roman" panose="02020603050405020304" pitchFamily="18" charset="0"/>
+                  <a:cs typeface="Times New Roman" panose="02020603050405020304" pitchFamily="18" charset="0"/>
+                </a:rPr>
+                <a:t>バッチ正規化とは、バッチ内の</a:t>
+              </a:r>
+              <a:r>
+                <a:rPr lang="ja-JP" altLang="en-US" sz="1400" b="0" i="0" u="none" strike="noStrike">
+                  <a:solidFill>
+                    <a:srgbClr val="FFFF00"/>
+                  </a:solidFill>
+                  <a:effectLst/>
+                  <a:latin typeface="Times New Roman" panose="02020603050405020304" pitchFamily="18" charset="0"/>
+                  <a:cs typeface="Times New Roman" panose="02020603050405020304" pitchFamily="18" charset="0"/>
+                </a:rPr>
+                <a:t>データ分布</a:t>
+              </a:r>
+              <a:r>
+                <a:rPr lang="ja-JP" altLang="en-US" sz="1400" b="0" i="0" u="none" strike="noStrike">
+                  <a:solidFill>
+                    <a:srgbClr val="111111"/>
+                  </a:solidFill>
+                  <a:effectLst/>
+                  <a:latin typeface="Times New Roman" panose="02020603050405020304" pitchFamily="18" charset="0"/>
+                  <a:cs typeface="Times New Roman" panose="02020603050405020304" pitchFamily="18" charset="0"/>
+                </a:rPr>
+                <a:t>をもとに，</a:t>
+              </a:r>
+              <a:r>
+                <a:rPr lang="ja-JP" altLang="en-US" sz="1400" i="0" u="none" strike="noStrike">
+                  <a:solidFill>
+                    <a:srgbClr val="FFFF00"/>
+                  </a:solidFill>
+                  <a:effectLst/>
+                  <a:latin typeface="Times New Roman" panose="02020603050405020304" pitchFamily="18" charset="0"/>
+                  <a:cs typeface="Times New Roman" panose="02020603050405020304" pitchFamily="18" charset="0"/>
+                </a:rPr>
+                <a:t>各チャンネルごと</a:t>
+              </a:r>
+              <a:r>
+                <a:rPr lang="ja-JP" altLang="en-US" sz="1400" b="1" i="0" u="none" strike="noStrike">
+                  <a:solidFill>
+                    <a:srgbClr val="111111"/>
+                  </a:solidFill>
+                  <a:effectLst/>
+                  <a:latin typeface="Times New Roman" panose="02020603050405020304" pitchFamily="18" charset="0"/>
+                  <a:cs typeface="Times New Roman" panose="02020603050405020304" pitchFamily="18" charset="0"/>
+                </a:rPr>
+                <a:t>に</a:t>
+              </a:r>
+              <a:r>
+                <a:rPr lang="ja-JP" altLang="en-US" sz="1400" b="0" i="0" u="none" strike="noStrike">
+                  <a:solidFill>
+                    <a:srgbClr val="111111"/>
+                  </a:solidFill>
+                  <a:effectLst/>
+                  <a:latin typeface="Times New Roman" panose="02020603050405020304" pitchFamily="18" charset="0"/>
+                  <a:cs typeface="Times New Roman" panose="02020603050405020304" pitchFamily="18" charset="0"/>
+                </a:rPr>
+                <a:t>特徴を正規化</a:t>
+              </a:r>
+              <a:endParaRPr lang="ja-JP" altLang="en-US" sz="1600">
+                <a:latin typeface="Times New Roman" panose="02020603050405020304" pitchFamily="18" charset="0"/>
+                <a:cs typeface="Times New Roman" panose="02020603050405020304" pitchFamily="18" charset="0"/>
+              </a:endParaRPr>
+            </a:p>
+          </p:txBody>
+        </p:sp>
+      </p:grpSp>
     </p:spTree>
     <p:extLst>
       <p:ext uri="{BB962C8B-B14F-4D97-AF65-F5344CB8AC3E}">
-        <p14:creationId xmlns:p14="http://schemas.microsoft.com/office/powerpoint/2010/main" val="3004253922"/>
+        <p14:creationId xmlns:p14="http://schemas.microsoft.com/office/powerpoint/2010/main" val="3754848895"/>
       </p:ext>
     </p:extLst>
   </p:cSld>
   <p:clrMapOvr>
     <a:masterClrMapping/>
   </p:clrMapOvr>
+  <p:timing>
+    <p:tnLst>
+      <p:par>
+        <p:cTn id="1" dur="indefinite" restart="never" nodeType="tmRoot">
+          <p:childTnLst>
+            <p:seq concurrent="1" nextAc="seek">
+              <p:cTn id="2" dur="indefinite" nodeType="mainSeq">
+                <p:childTnLst>
+                  <p:par>
+                    <p:cTn id="3" fill="hold">
+                      <p:stCondLst>
+                        <p:cond delay="indefinite"/>
+                      </p:stCondLst>
+                      <p:childTnLst>
+                        <p:par>
+                          <p:cTn id="4" fill="hold">
+                            <p:stCondLst>
+                              <p:cond delay="0"/>
+                            </p:stCondLst>
+                            <p:childTnLst>
+                              <p:par>
+                                <p:cTn id="5" presetID="1" presetClass="entr" presetSubtype="0" fill="hold" grpId="0" nodeType="clickEffect">
+                                  <p:stCondLst>
+                                    <p:cond delay="0"/>
+                                  </p:stCondLst>
+                                  <p:childTnLst>
+                                    <p:set>
+                                      <p:cBhvr>
+                                        <p:cTn id="6" dur="1" fill="hold">
+                                          <p:stCondLst>
+                                            <p:cond delay="0"/>
+                                          </p:stCondLst>
+                                        </p:cTn>
+                                        <p:tgtEl>
+                                          <p:spTgt spid="9"/>
+                                        </p:tgtEl>
+                                        <p:attrNameLst>
+                                          <p:attrName>style.visibility</p:attrName>
+                                        </p:attrNameLst>
+                                      </p:cBhvr>
+                                      <p:to>
+                                        <p:strVal val="visible"/>
+                                      </p:to>
+                                    </p:set>
+                                  </p:childTnLst>
+                                </p:cTn>
+                              </p:par>
+                              <p:par>
+                                <p:cTn id="7" presetID="1" presetClass="entr" presetSubtype="0" fill="hold" grpId="0" nodeType="withEffect">
+                                  <p:stCondLst>
+                                    <p:cond delay="0"/>
+                                  </p:stCondLst>
+                                  <p:childTnLst>
+                                    <p:set>
+                                      <p:cBhvr>
+                                        <p:cTn id="8" dur="1" fill="hold">
+                                          <p:stCondLst>
+                                            <p:cond delay="0"/>
+                                          </p:stCondLst>
+                                        </p:cTn>
+                                        <p:tgtEl>
+                                          <p:spTgt spid="44"/>
+                                        </p:tgtEl>
+                                        <p:attrNameLst>
+                                          <p:attrName>style.visibility</p:attrName>
+                                        </p:attrNameLst>
+                                      </p:cBhvr>
+                                      <p:to>
+                                        <p:strVal val="visible"/>
+                                      </p:to>
+                                    </p:set>
+                                  </p:childTnLst>
+                                </p:cTn>
+                              </p:par>
+                            </p:childTnLst>
+                          </p:cTn>
+                        </p:par>
+                      </p:childTnLst>
+                    </p:cTn>
+                  </p:par>
+                  <p:par>
+                    <p:cTn id="9" fill="hold">
+                      <p:stCondLst>
+                        <p:cond delay="indefinite"/>
+                      </p:stCondLst>
+                      <p:childTnLst>
+                        <p:par>
+                          <p:cTn id="10" fill="hold">
+                            <p:stCondLst>
+                              <p:cond delay="0"/>
+                            </p:stCondLst>
+                            <p:childTnLst>
+                              <p:par>
+                                <p:cTn id="11" presetID="1" presetClass="entr" presetSubtype="0" fill="hold" grpId="0" nodeType="clickEffect">
+                                  <p:stCondLst>
+                                    <p:cond delay="0"/>
+                                  </p:stCondLst>
+                                  <p:childTnLst>
+                                    <p:set>
+                                      <p:cBhvr>
+                                        <p:cTn id="12" dur="1" fill="hold">
+                                          <p:stCondLst>
+                                            <p:cond delay="0"/>
+                                          </p:stCondLst>
+                                        </p:cTn>
+                                        <p:tgtEl>
+                                          <p:spTgt spid="10"/>
+                                        </p:tgtEl>
+                                        <p:attrNameLst>
+                                          <p:attrName>style.visibility</p:attrName>
+                                        </p:attrNameLst>
+                                      </p:cBhvr>
+                                      <p:to>
+                                        <p:strVal val="visible"/>
+                                      </p:to>
+                                    </p:set>
+                                  </p:childTnLst>
+                                </p:cTn>
+                              </p:par>
+                              <p:par>
+                                <p:cTn id="13" presetID="1" presetClass="entr" presetSubtype="0" fill="hold" grpId="0" nodeType="withEffect">
+                                  <p:stCondLst>
+                                    <p:cond delay="0"/>
+                                  </p:stCondLst>
+                                  <p:childTnLst>
+                                    <p:set>
+                                      <p:cBhvr>
+                                        <p:cTn id="14" dur="1" fill="hold">
+                                          <p:stCondLst>
+                                            <p:cond delay="0"/>
+                                          </p:stCondLst>
+                                        </p:cTn>
+                                        <p:tgtEl>
+                                          <p:spTgt spid="52"/>
+                                        </p:tgtEl>
+                                        <p:attrNameLst>
+                                          <p:attrName>style.visibility</p:attrName>
+                                        </p:attrNameLst>
+                                      </p:cBhvr>
+                                      <p:to>
+                                        <p:strVal val="visible"/>
+                                      </p:to>
+                                    </p:set>
+                                  </p:childTnLst>
+                                </p:cTn>
+                              </p:par>
+                            </p:childTnLst>
+                          </p:cTn>
+                        </p:par>
+                      </p:childTnLst>
+                    </p:cTn>
+                  </p:par>
+                  <p:par>
+                    <p:cTn id="15" fill="hold">
+                      <p:stCondLst>
+                        <p:cond delay="indefinite"/>
+                      </p:stCondLst>
+                      <p:childTnLst>
+                        <p:par>
+                          <p:cTn id="16" fill="hold">
+                            <p:stCondLst>
+                              <p:cond delay="0"/>
+                            </p:stCondLst>
+                            <p:childTnLst>
+                              <p:par>
+                                <p:cTn id="17" presetID="1" presetClass="entr" presetSubtype="0" fill="hold" grpId="0" nodeType="clickEffect">
+                                  <p:stCondLst>
+                                    <p:cond delay="0"/>
+                                  </p:stCondLst>
+                                  <p:childTnLst>
+                                    <p:set>
+                                      <p:cBhvr>
+                                        <p:cTn id="18" dur="1" fill="hold">
+                                          <p:stCondLst>
+                                            <p:cond delay="0"/>
+                                          </p:stCondLst>
+                                        </p:cTn>
+                                        <p:tgtEl>
+                                          <p:spTgt spid="11"/>
+                                        </p:tgtEl>
+                                        <p:attrNameLst>
+                                          <p:attrName>style.visibility</p:attrName>
+                                        </p:attrNameLst>
+                                      </p:cBhvr>
+                                      <p:to>
+                                        <p:strVal val="visible"/>
+                                      </p:to>
+                                    </p:set>
+                                  </p:childTnLst>
+                                </p:cTn>
+                              </p:par>
+                            </p:childTnLst>
+                          </p:cTn>
+                        </p:par>
+                      </p:childTnLst>
+                    </p:cTn>
+                  </p:par>
+                  <p:par>
+                    <p:cTn id="19" fill="hold">
+                      <p:stCondLst>
+                        <p:cond delay="indefinite"/>
+                      </p:stCondLst>
+                      <p:childTnLst>
+                        <p:par>
+                          <p:cTn id="20" fill="hold">
+                            <p:stCondLst>
+                              <p:cond delay="0"/>
+                            </p:stCondLst>
+                            <p:childTnLst>
+                              <p:par>
+                                <p:cTn id="21" presetID="1" presetClass="entr" presetSubtype="0" fill="hold" grpId="0" nodeType="clickEffect">
+                                  <p:stCondLst>
+                                    <p:cond delay="0"/>
+                                  </p:stCondLst>
+                                  <p:childTnLst>
+                                    <p:set>
+                                      <p:cBhvr>
+                                        <p:cTn id="22" dur="1" fill="hold">
+                                          <p:stCondLst>
+                                            <p:cond delay="0"/>
+                                          </p:stCondLst>
+                                        </p:cTn>
+                                        <p:tgtEl>
+                                          <p:spTgt spid="12"/>
+                                        </p:tgtEl>
+                                        <p:attrNameLst>
+                                          <p:attrName>style.visibility</p:attrName>
+                                        </p:attrNameLst>
+                                      </p:cBhvr>
+                                      <p:to>
+                                        <p:strVal val="visible"/>
+                                      </p:to>
+                                    </p:set>
+                                  </p:childTnLst>
+                                </p:cTn>
+                              </p:par>
+                              <p:par>
+                                <p:cTn id="23" presetID="1" presetClass="entr" presetSubtype="0" fill="hold" grpId="0" nodeType="withEffect">
+                                  <p:stCondLst>
+                                    <p:cond delay="0"/>
+                                  </p:stCondLst>
+                                  <p:childTnLst>
+                                    <p:set>
+                                      <p:cBhvr>
+                                        <p:cTn id="24" dur="1" fill="hold">
+                                          <p:stCondLst>
+                                            <p:cond delay="0"/>
+                                          </p:stCondLst>
+                                        </p:cTn>
+                                        <p:tgtEl>
+                                          <p:spTgt spid="53"/>
+                                        </p:tgtEl>
+                                        <p:attrNameLst>
+                                          <p:attrName>style.visibility</p:attrName>
+                                        </p:attrNameLst>
+                                      </p:cBhvr>
+                                      <p:to>
+                                        <p:strVal val="visible"/>
+                                      </p:to>
+                                    </p:set>
+                                  </p:childTnLst>
+                                </p:cTn>
+                              </p:par>
+                            </p:childTnLst>
+                          </p:cTn>
+                        </p:par>
+                      </p:childTnLst>
+                    </p:cTn>
+                  </p:par>
+                  <p:par>
+                    <p:cTn id="25" fill="hold">
+                      <p:stCondLst>
+                        <p:cond delay="indefinite"/>
+                      </p:stCondLst>
+                      <p:childTnLst>
+                        <p:par>
+                          <p:cTn id="26" fill="hold">
+                            <p:stCondLst>
+                              <p:cond delay="0"/>
+                            </p:stCondLst>
+                            <p:childTnLst>
+                              <p:par>
+                                <p:cTn id="27" presetID="1" presetClass="entr" presetSubtype="0" fill="hold" grpId="0" nodeType="clickEffect">
+                                  <p:stCondLst>
+                                    <p:cond delay="0"/>
+                                  </p:stCondLst>
+                                  <p:childTnLst>
+                                    <p:set>
+                                      <p:cBhvr>
+                                        <p:cTn id="28" dur="1" fill="hold">
+                                          <p:stCondLst>
+                                            <p:cond delay="0"/>
+                                          </p:stCondLst>
+                                        </p:cTn>
+                                        <p:tgtEl>
+                                          <p:spTgt spid="13"/>
+                                        </p:tgtEl>
+                                        <p:attrNameLst>
+                                          <p:attrName>style.visibility</p:attrName>
+                                        </p:attrNameLst>
+                                      </p:cBhvr>
+                                      <p:to>
+                                        <p:strVal val="visible"/>
+                                      </p:to>
+                                    </p:set>
+                                  </p:childTnLst>
+                                </p:cTn>
+                              </p:par>
+                            </p:childTnLst>
+                          </p:cTn>
+                        </p:par>
+                      </p:childTnLst>
+                    </p:cTn>
+                  </p:par>
+                  <p:par>
+                    <p:cTn id="29" fill="hold">
+                      <p:stCondLst>
+                        <p:cond delay="indefinite"/>
+                      </p:stCondLst>
+                      <p:childTnLst>
+                        <p:par>
+                          <p:cTn id="30" fill="hold">
+                            <p:stCondLst>
+                              <p:cond delay="0"/>
+                            </p:stCondLst>
+                            <p:childTnLst>
+                              <p:par>
+                                <p:cTn id="31" presetID="1" presetClass="entr" presetSubtype="0" fill="hold" grpId="0" nodeType="clickEffect">
+                                  <p:stCondLst>
+                                    <p:cond delay="0"/>
+                                  </p:stCondLst>
+                                  <p:childTnLst>
+                                    <p:set>
+                                      <p:cBhvr>
+                                        <p:cTn id="32" dur="1" fill="hold">
+                                          <p:stCondLst>
+                                            <p:cond delay="0"/>
+                                          </p:stCondLst>
+                                        </p:cTn>
+                                        <p:tgtEl>
+                                          <p:spTgt spid="50"/>
+                                        </p:tgtEl>
+                                        <p:attrNameLst>
+                                          <p:attrName>style.visibility</p:attrName>
+                                        </p:attrNameLst>
+                                      </p:cBhvr>
+                                      <p:to>
+                                        <p:strVal val="visible"/>
+                                      </p:to>
+                                    </p:set>
+                                  </p:childTnLst>
+                                </p:cTn>
+                              </p:par>
+                              <p:par>
+                                <p:cTn id="33" presetID="1" presetClass="entr" presetSubtype="0" fill="hold" grpId="0" nodeType="withEffect">
+                                  <p:stCondLst>
+                                    <p:cond delay="0"/>
+                                  </p:stCondLst>
+                                  <p:childTnLst>
+                                    <p:set>
+                                      <p:cBhvr>
+                                        <p:cTn id="34" dur="1" fill="hold">
+                                          <p:stCondLst>
+                                            <p:cond delay="0"/>
+                                          </p:stCondLst>
+                                        </p:cTn>
+                                        <p:tgtEl>
+                                          <p:spTgt spid="54"/>
+                                        </p:tgtEl>
+                                        <p:attrNameLst>
+                                          <p:attrName>style.visibility</p:attrName>
+                                        </p:attrNameLst>
+                                      </p:cBhvr>
+                                      <p:to>
+                                        <p:strVal val="visible"/>
+                                      </p:to>
+                                    </p:set>
+                                  </p:childTnLst>
+                                </p:cTn>
+                              </p:par>
+                            </p:childTnLst>
+                          </p:cTn>
+                        </p:par>
+                      </p:childTnLst>
+                    </p:cTn>
+                  </p:par>
+                  <p:par>
+                    <p:cTn id="35" fill="hold">
+                      <p:stCondLst>
+                        <p:cond delay="indefinite"/>
+                      </p:stCondLst>
+                      <p:childTnLst>
+                        <p:par>
+                          <p:cTn id="36" fill="hold">
+                            <p:stCondLst>
+                              <p:cond delay="0"/>
+                            </p:stCondLst>
+                            <p:childTnLst>
+                              <p:par>
+                                <p:cTn id="37" presetID="1" presetClass="entr" presetSubtype="0" fill="hold" grpId="0" nodeType="clickEffect">
+                                  <p:stCondLst>
+                                    <p:cond delay="0"/>
+                                  </p:stCondLst>
+                                  <p:childTnLst>
+                                    <p:set>
+                                      <p:cBhvr>
+                                        <p:cTn id="38" dur="1" fill="hold">
+                                          <p:stCondLst>
+                                            <p:cond delay="0"/>
+                                          </p:stCondLst>
+                                        </p:cTn>
+                                        <p:tgtEl>
+                                          <p:spTgt spid="28"/>
+                                        </p:tgtEl>
+                                        <p:attrNameLst>
+                                          <p:attrName>style.visibility</p:attrName>
+                                        </p:attrNameLst>
+                                      </p:cBhvr>
+                                      <p:to>
+                                        <p:strVal val="visible"/>
+                                      </p:to>
+                                    </p:set>
+                                  </p:childTnLst>
+                                </p:cTn>
+                              </p:par>
+                              <p:par>
+                                <p:cTn id="39" presetID="1" presetClass="entr" presetSubtype="0" fill="hold" grpId="0" nodeType="withEffect">
+                                  <p:stCondLst>
+                                    <p:cond delay="0"/>
+                                  </p:stCondLst>
+                                  <p:childTnLst>
+                                    <p:set>
+                                      <p:cBhvr>
+                                        <p:cTn id="40" dur="1" fill="hold">
+                                          <p:stCondLst>
+                                            <p:cond delay="0"/>
+                                          </p:stCondLst>
+                                        </p:cTn>
+                                        <p:tgtEl>
+                                          <p:spTgt spid="55"/>
+                                        </p:tgtEl>
+                                        <p:attrNameLst>
+                                          <p:attrName>style.visibility</p:attrName>
+                                        </p:attrNameLst>
+                                      </p:cBhvr>
+                                      <p:to>
+                                        <p:strVal val="visible"/>
+                                      </p:to>
+                                    </p:set>
+                                  </p:childTnLst>
+                                </p:cTn>
+                              </p:par>
+                            </p:childTnLst>
+                          </p:cTn>
+                        </p:par>
+                      </p:childTnLst>
+                    </p:cTn>
+                  </p:par>
+                  <p:par>
+                    <p:cTn id="41" fill="hold">
+                      <p:stCondLst>
+                        <p:cond delay="indefinite"/>
+                      </p:stCondLst>
+                      <p:childTnLst>
+                        <p:par>
+                          <p:cTn id="42" fill="hold">
+                            <p:stCondLst>
+                              <p:cond delay="0"/>
+                            </p:stCondLst>
+                            <p:childTnLst>
+                              <p:par>
+                                <p:cTn id="43" presetID="1" presetClass="entr" presetSubtype="0" fill="hold" grpId="0" nodeType="clickEffect">
+                                  <p:stCondLst>
+                                    <p:cond delay="0"/>
+                                  </p:stCondLst>
+                                  <p:childTnLst>
+                                    <p:set>
+                                      <p:cBhvr>
+                                        <p:cTn id="44" dur="1" fill="hold">
+                                          <p:stCondLst>
+                                            <p:cond delay="0"/>
+                                          </p:stCondLst>
+                                        </p:cTn>
+                                        <p:tgtEl>
+                                          <p:spTgt spid="23"/>
+                                        </p:tgtEl>
+                                        <p:attrNameLst>
+                                          <p:attrName>style.visibility</p:attrName>
+                                        </p:attrNameLst>
+                                      </p:cBhvr>
+                                      <p:to>
+                                        <p:strVal val="visible"/>
+                                      </p:to>
+                                    </p:set>
+                                  </p:childTnLst>
+                                </p:cTn>
+                              </p:par>
+                              <p:par>
+                                <p:cTn id="45" presetID="1" presetClass="entr" presetSubtype="0" fill="hold" grpId="0" nodeType="withEffect">
+                                  <p:stCondLst>
+                                    <p:cond delay="0"/>
+                                  </p:stCondLst>
+                                  <p:childTnLst>
+                                    <p:set>
+                                      <p:cBhvr>
+                                        <p:cTn id="46" dur="1" fill="hold">
+                                          <p:stCondLst>
+                                            <p:cond delay="0"/>
+                                          </p:stCondLst>
+                                        </p:cTn>
+                                        <p:tgtEl>
+                                          <p:spTgt spid="56"/>
+                                        </p:tgtEl>
+                                        <p:attrNameLst>
+                                          <p:attrName>style.visibility</p:attrName>
+                                        </p:attrNameLst>
+                                      </p:cBhvr>
+                                      <p:to>
+                                        <p:strVal val="visible"/>
+                                      </p:to>
+                                    </p:set>
+                                  </p:childTnLst>
+                                </p:cTn>
+                              </p:par>
+                            </p:childTnLst>
+                          </p:cTn>
+                        </p:par>
+                      </p:childTnLst>
+                    </p:cTn>
+                  </p:par>
+                  <p:par>
+                    <p:cTn id="47" fill="hold">
+                      <p:stCondLst>
+                        <p:cond delay="indefinite"/>
+                      </p:stCondLst>
+                      <p:childTnLst>
+                        <p:par>
+                          <p:cTn id="48" fill="hold">
+                            <p:stCondLst>
+                              <p:cond delay="0"/>
+                            </p:stCondLst>
+                            <p:childTnLst>
+                              <p:par>
+                                <p:cTn id="49" presetID="1" presetClass="entr" presetSubtype="0" fill="hold" grpId="0" nodeType="clickEffect">
+                                  <p:stCondLst>
+                                    <p:cond delay="0"/>
+                                  </p:stCondLst>
+                                  <p:childTnLst>
+                                    <p:set>
+                                      <p:cBhvr>
+                                        <p:cTn id="50" dur="1" fill="hold">
+                                          <p:stCondLst>
+                                            <p:cond delay="0"/>
+                                          </p:stCondLst>
+                                        </p:cTn>
+                                        <p:tgtEl>
+                                          <p:spTgt spid="33"/>
+                                        </p:tgtEl>
+                                        <p:attrNameLst>
+                                          <p:attrName>style.visibility</p:attrName>
+                                        </p:attrNameLst>
+                                      </p:cBhvr>
+                                      <p:to>
+                                        <p:strVal val="visible"/>
+                                      </p:to>
+                                    </p:set>
+                                  </p:childTnLst>
+                                </p:cTn>
+                              </p:par>
+                              <p:par>
+                                <p:cTn id="51" presetID="1" presetClass="entr" presetSubtype="0" fill="hold" grpId="0" nodeType="withEffect">
+                                  <p:stCondLst>
+                                    <p:cond delay="0"/>
+                                  </p:stCondLst>
+                                  <p:childTnLst>
+                                    <p:set>
+                                      <p:cBhvr>
+                                        <p:cTn id="52" dur="1" fill="hold">
+                                          <p:stCondLst>
+                                            <p:cond delay="0"/>
+                                          </p:stCondLst>
+                                        </p:cTn>
+                                        <p:tgtEl>
+                                          <p:spTgt spid="57"/>
+                                        </p:tgtEl>
+                                        <p:attrNameLst>
+                                          <p:attrName>style.visibility</p:attrName>
+                                        </p:attrNameLst>
+                                      </p:cBhvr>
+                                      <p:to>
+                                        <p:strVal val="visible"/>
+                                      </p:to>
+                                    </p:set>
+                                  </p:childTnLst>
+                                </p:cTn>
+                              </p:par>
+                            </p:childTnLst>
+                          </p:cTn>
+                        </p:par>
+                      </p:childTnLst>
+                    </p:cTn>
+                  </p:par>
+                  <p:par>
+                    <p:cTn id="53" fill="hold">
+                      <p:stCondLst>
+                        <p:cond delay="indefinite"/>
+                      </p:stCondLst>
+                      <p:childTnLst>
+                        <p:par>
+                          <p:cTn id="54" fill="hold">
+                            <p:stCondLst>
+                              <p:cond delay="0"/>
+                            </p:stCondLst>
+                            <p:childTnLst>
+                              <p:par>
+                                <p:cTn id="55" presetID="1" presetClass="entr" presetSubtype="0" fill="hold" grpId="0" nodeType="clickEffect">
+                                  <p:stCondLst>
+                                    <p:cond delay="0"/>
+                                  </p:stCondLst>
+                                  <p:childTnLst>
+                                    <p:set>
+                                      <p:cBhvr>
+                                        <p:cTn id="56" dur="1" fill="hold">
+                                          <p:stCondLst>
+                                            <p:cond delay="0"/>
+                                          </p:stCondLst>
+                                        </p:cTn>
+                                        <p:tgtEl>
+                                          <p:spTgt spid="37"/>
+                                        </p:tgtEl>
+                                        <p:attrNameLst>
+                                          <p:attrName>style.visibility</p:attrName>
+                                        </p:attrNameLst>
+                                      </p:cBhvr>
+                                      <p:to>
+                                        <p:strVal val="visible"/>
+                                      </p:to>
+                                    </p:set>
+                                  </p:childTnLst>
+                                </p:cTn>
+                              </p:par>
+                              <p:par>
+                                <p:cTn id="57" presetID="1" presetClass="entr" presetSubtype="0" fill="hold" grpId="0" nodeType="withEffect">
+                                  <p:stCondLst>
+                                    <p:cond delay="0"/>
+                                  </p:stCondLst>
+                                  <p:childTnLst>
+                                    <p:set>
+                                      <p:cBhvr>
+                                        <p:cTn id="58" dur="1" fill="hold">
+                                          <p:stCondLst>
+                                            <p:cond delay="0"/>
+                                          </p:stCondLst>
+                                        </p:cTn>
+                                        <p:tgtEl>
+                                          <p:spTgt spid="58"/>
+                                        </p:tgtEl>
+                                        <p:attrNameLst>
+                                          <p:attrName>style.visibility</p:attrName>
+                                        </p:attrNameLst>
+                                      </p:cBhvr>
+                                      <p:to>
+                                        <p:strVal val="visible"/>
+                                      </p:to>
+                                    </p:set>
+                                  </p:childTnLst>
+                                </p:cTn>
+                              </p:par>
+                            </p:childTnLst>
+                          </p:cTn>
+                        </p:par>
+                      </p:childTnLst>
+                    </p:cTn>
+                  </p:par>
+                  <p:par>
+                    <p:cTn id="59" fill="hold">
+                      <p:stCondLst>
+                        <p:cond delay="indefinite"/>
+                      </p:stCondLst>
+                      <p:childTnLst>
+                        <p:par>
+                          <p:cTn id="60" fill="hold">
+                            <p:stCondLst>
+                              <p:cond delay="0"/>
+                            </p:stCondLst>
+                            <p:childTnLst>
+                              <p:par>
+                                <p:cTn id="61" presetID="1" presetClass="entr" presetSubtype="0" fill="hold" grpId="0" nodeType="clickEffect">
+                                  <p:stCondLst>
+                                    <p:cond delay="0"/>
+                                  </p:stCondLst>
+                                  <p:childTnLst>
+                                    <p:set>
+                                      <p:cBhvr>
+                                        <p:cTn id="62" dur="1" fill="hold">
+                                          <p:stCondLst>
+                                            <p:cond delay="0"/>
+                                          </p:stCondLst>
+                                        </p:cTn>
+                                        <p:tgtEl>
+                                          <p:spTgt spid="42"/>
+                                        </p:tgtEl>
+                                        <p:attrNameLst>
+                                          <p:attrName>style.visibility</p:attrName>
+                                        </p:attrNameLst>
+                                      </p:cBhvr>
+                                      <p:to>
+                                        <p:strVal val="visible"/>
+                                      </p:to>
+                                    </p:set>
+                                  </p:childTnLst>
+                                </p:cTn>
+                              </p:par>
+                              <p:par>
+                                <p:cTn id="63" presetID="1" presetClass="entr" presetSubtype="0" fill="hold" grpId="0" nodeType="withEffect">
+                                  <p:stCondLst>
+                                    <p:cond delay="0"/>
+                                  </p:stCondLst>
+                                  <p:childTnLst>
+                                    <p:set>
+                                      <p:cBhvr>
+                                        <p:cTn id="64" dur="1" fill="hold">
+                                          <p:stCondLst>
+                                            <p:cond delay="0"/>
+                                          </p:stCondLst>
+                                        </p:cTn>
+                                        <p:tgtEl>
+                                          <p:spTgt spid="59"/>
+                                        </p:tgtEl>
+                                        <p:attrNameLst>
+                                          <p:attrName>style.visibility</p:attrName>
+                                        </p:attrNameLst>
+                                      </p:cBhvr>
+                                      <p:to>
+                                        <p:strVal val="visible"/>
+                                      </p:to>
+                                    </p:set>
+                                  </p:childTnLst>
+                                </p:cTn>
+                              </p:par>
+                              <p:par>
+                                <p:cTn id="65" presetID="1" presetClass="entr" presetSubtype="0" fill="hold" grpId="1" nodeType="withEffect">
+                                  <p:stCondLst>
+                                    <p:cond delay="0"/>
+                                  </p:stCondLst>
+                                  <p:childTnLst>
+                                    <p:set>
+                                      <p:cBhvr>
+                                        <p:cTn id="66" dur="1" fill="hold">
+                                          <p:stCondLst>
+                                            <p:cond delay="0"/>
+                                          </p:stCondLst>
+                                        </p:cTn>
+                                        <p:tgtEl>
+                                          <p:spTgt spid="9"/>
+                                        </p:tgtEl>
+                                        <p:attrNameLst>
+                                          <p:attrName>style.visibility</p:attrName>
+                                        </p:attrNameLst>
+                                      </p:cBhvr>
+                                      <p:to>
+                                        <p:strVal val="visible"/>
+                                      </p:to>
+                                    </p:set>
+                                  </p:childTnLst>
+                                </p:cTn>
+                              </p:par>
+                            </p:childTnLst>
+                          </p:cTn>
+                        </p:par>
+                      </p:childTnLst>
+                    </p:cTn>
+                  </p:par>
+                  <p:par>
+                    <p:cTn id="67" fill="hold">
+                      <p:stCondLst>
+                        <p:cond delay="indefinite"/>
+                      </p:stCondLst>
+                      <p:childTnLst>
+                        <p:par>
+                          <p:cTn id="68" fill="hold">
+                            <p:stCondLst>
+                              <p:cond delay="0"/>
+                            </p:stCondLst>
+                            <p:childTnLst>
+                              <p:par>
+                                <p:cTn id="69" presetID="42" presetClass="entr" presetSubtype="0" fill="hold" nodeType="clickEffect">
+                                  <p:stCondLst>
+                                    <p:cond delay="0"/>
+                                  </p:stCondLst>
+                                  <p:childTnLst>
+                                    <p:set>
+                                      <p:cBhvr>
+                                        <p:cTn id="70" dur="1" fill="hold">
+                                          <p:stCondLst>
+                                            <p:cond delay="0"/>
+                                          </p:stCondLst>
+                                        </p:cTn>
+                                        <p:tgtEl>
+                                          <p:spTgt spid="62"/>
+                                        </p:tgtEl>
+                                        <p:attrNameLst>
+                                          <p:attrName>style.visibility</p:attrName>
+                                        </p:attrNameLst>
+                                      </p:cBhvr>
+                                      <p:to>
+                                        <p:strVal val="visible"/>
+                                      </p:to>
+                                    </p:set>
+                                    <p:animEffect transition="in" filter="fade">
+                                      <p:cBhvr>
+                                        <p:cTn id="71" dur="1000"/>
+                                        <p:tgtEl>
+                                          <p:spTgt spid="62"/>
+                                        </p:tgtEl>
+                                      </p:cBhvr>
+                                    </p:animEffect>
+                                    <p:anim calcmode="lin" valueType="num">
+                                      <p:cBhvr>
+                                        <p:cTn id="72" dur="1000" fill="hold"/>
+                                        <p:tgtEl>
+                                          <p:spTgt spid="62"/>
+                                        </p:tgtEl>
+                                        <p:attrNameLst>
+                                          <p:attrName>ppt_x</p:attrName>
+                                        </p:attrNameLst>
+                                      </p:cBhvr>
+                                      <p:tavLst>
+                                        <p:tav tm="0">
+                                          <p:val>
+                                            <p:strVal val="#ppt_x"/>
+                                          </p:val>
+                                        </p:tav>
+                                        <p:tav tm="100000">
+                                          <p:val>
+                                            <p:strVal val="#ppt_x"/>
+                                          </p:val>
+                                        </p:tav>
+                                      </p:tavLst>
+                                    </p:anim>
+                                    <p:anim calcmode="lin" valueType="num">
+                                      <p:cBhvr>
+                                        <p:cTn id="73" dur="1000" fill="hold"/>
+                                        <p:tgtEl>
+                                          <p:spTgt spid="62"/>
+                                        </p:tgtEl>
+                                        <p:attrNameLst>
+                                          <p:attrName>ppt_y</p:attrName>
+                                        </p:attrNameLst>
+                                      </p:cBhvr>
+                                      <p:tavLst>
+                                        <p:tav tm="0">
+                                          <p:val>
+                                            <p:strVal val="#ppt_y+.1"/>
+                                          </p:val>
+                                        </p:tav>
+                                        <p:tav tm="100000">
+                                          <p:val>
+                                            <p:strVal val="#ppt_y"/>
+                                          </p:val>
+                                        </p:tav>
+                                      </p:tavLst>
+                                    </p:anim>
+                                  </p:childTnLst>
+                                </p:cTn>
+                              </p:par>
+                            </p:childTnLst>
+                          </p:cTn>
+                        </p:par>
+                      </p:childTnLst>
+                    </p:cTn>
+                  </p:par>
+                </p:childTnLst>
+              </p:cTn>
+              <p:prevCondLst>
+                <p:cond evt="onPrev" delay="0">
+                  <p:tgtEl>
+                    <p:sldTgt/>
+                  </p:tgtEl>
+                </p:cond>
+              </p:prevCondLst>
+              <p:nextCondLst>
+                <p:cond evt="onNext" delay="0">
+                  <p:tgtEl>
+                    <p:sldTgt/>
+                  </p:tgtEl>
+                </p:cond>
+              </p:nextCondLst>
+            </p:seq>
+          </p:childTnLst>
+        </p:cTn>
+      </p:par>
+    </p:tnLst>
+    <p:bldLst>
+      <p:bldP spid="9" grpId="0" animBg="1"/>
+      <p:bldP spid="9" grpId="1" animBg="1"/>
+      <p:bldP spid="10" grpId="0" animBg="1"/>
+      <p:bldP spid="11" grpId="0" animBg="1"/>
+      <p:bldP spid="12" grpId="0" animBg="1"/>
+      <p:bldP spid="13" grpId="0" animBg="1"/>
+      <p:bldP spid="23" grpId="0" animBg="1"/>
+      <p:bldP spid="28" grpId="0" animBg="1"/>
+      <p:bldP spid="33" grpId="0" animBg="1"/>
+      <p:bldP spid="37" grpId="0" animBg="1"/>
+      <p:bldP spid="42" grpId="0" animBg="1"/>
+      <p:bldP spid="50" grpId="0" animBg="1"/>
+      <p:bldP spid="44" grpId="0" animBg="1"/>
+      <p:bldP spid="52" grpId="0" animBg="1"/>
+      <p:bldP spid="53" grpId="0" animBg="1"/>
+      <p:bldP spid="54" grpId="0" animBg="1"/>
+      <p:bldP spid="55" grpId="0" animBg="1"/>
+      <p:bldP spid="56" grpId="0" animBg="1"/>
+      <p:bldP spid="57" grpId="0" animBg="1"/>
+      <p:bldP spid="58" grpId="0" animBg="1"/>
+      <p:bldP spid="59" grpId="0" animBg="1"/>
+    </p:bldLst>
+  </p:timing>
+</p:sld>
+</file>
+
+<file path=ppt/slides/slide6.xml><?xml version="1.0" encoding="utf-8"?>
+<p:sld xmlns:a="http://schemas.openxmlformats.org/drawingml/2006/main" xmlns:r="http://schemas.openxmlformats.org/officeDocument/2006/relationships" xmlns:p="http://schemas.openxmlformats.org/presentationml/2006/main">
+  <p:cSld>
+    <p:spTree>
+      <p:nvGrpSpPr>
+        <p:cNvPr id="1" name=""/>
+        <p:cNvGrpSpPr/>
+        <p:nvPr/>
+      </p:nvGrpSpPr>
+      <p:grpSpPr>
+        <a:xfrm>
+          <a:off x="0" y="0"/>
+          <a:ext cx="0" cy="0"/>
+          <a:chOff x="0" y="0"/>
+          <a:chExt cx="0" cy="0"/>
+        </a:xfrm>
+      </p:grpSpPr>
+      <p:sp>
+        <p:nvSpPr>
+          <p:cNvPr id="2" name="タイトル 1">
+            <a:extLst>
+              <a:ext uri="{FF2B5EF4-FFF2-40B4-BE49-F238E27FC236}">
+                <a16:creationId xmlns:a16="http://schemas.microsoft.com/office/drawing/2014/main" id="{D62A7AF9-8FD0-D74F-9D3F-2A68D8620742}"/>
+              </a:ext>
+            </a:extLst>
+          </p:cNvPr>
+          <p:cNvSpPr>
+            <a:spLocks noGrp="1"/>
+          </p:cNvSpPr>
+          <p:nvPr>
+            <p:ph type="title"/>
+          </p:nvPr>
+        </p:nvSpPr>
+        <p:spPr/>
+        <p:txBody>
+          <a:bodyPr/>
+          <a:lstStyle/>
+          <a:p>
+            <a:r>
+              <a:rPr kumimoji="1" lang="ja-JP" altLang="en-US"/>
+              <a:t>学習中の損失関数の値（</a:t>
+            </a:r>
+            <a:r>
+              <a:rPr kumimoji="1" lang="en-US" altLang="ja-JP" dirty="0"/>
+              <a:t>SGD)</a:t>
+            </a:r>
+            <a:endParaRPr kumimoji="1" lang="ja-JP" altLang="en-US"/>
+          </a:p>
+        </p:txBody>
+      </p:sp>
+      <p:pic>
+        <p:nvPicPr>
+          <p:cNvPr id="4" name="図 3">
+            <a:extLst>
+              <a:ext uri="{FF2B5EF4-FFF2-40B4-BE49-F238E27FC236}">
+                <a16:creationId xmlns:a16="http://schemas.microsoft.com/office/drawing/2014/main" id="{61F2C580-6FA1-A14E-9F7C-B2A7111E8269}"/>
+              </a:ext>
+            </a:extLst>
+          </p:cNvPr>
+          <p:cNvPicPr>
+            <a:picLocks noChangeAspect="1"/>
+          </p:cNvPicPr>
+          <p:nvPr/>
+        </p:nvPicPr>
+        <p:blipFill>
+          <a:blip r:embed="rId2"/>
+          <a:stretch>
+            <a:fillRect/>
+          </a:stretch>
+        </p:blipFill>
+        <p:spPr>
+          <a:xfrm>
+            <a:off x="241300" y="2109230"/>
+            <a:ext cx="5854700" cy="4394200"/>
+          </a:xfrm>
+          <a:prstGeom prst="rect">
+            <a:avLst/>
+          </a:prstGeom>
+        </p:spPr>
+      </p:pic>
+      <p:sp>
+        <p:nvSpPr>
+          <p:cNvPr id="5" name="テキスト ボックス 4">
+            <a:extLst>
+              <a:ext uri="{FF2B5EF4-FFF2-40B4-BE49-F238E27FC236}">
+                <a16:creationId xmlns:a16="http://schemas.microsoft.com/office/drawing/2014/main" id="{5B773223-D383-F849-8FE4-08F8E5C2BDD5}"/>
+              </a:ext>
+            </a:extLst>
+          </p:cNvPr>
+          <p:cNvSpPr txBox="1"/>
+          <p:nvPr/>
+        </p:nvSpPr>
+        <p:spPr>
+          <a:xfrm>
+            <a:off x="6559550" y="2109230"/>
+            <a:ext cx="4298950" cy="3778407"/>
+          </a:xfrm>
+          <a:prstGeom prst="rect">
+            <a:avLst/>
+          </a:prstGeom>
+          <a:noFill/>
+        </p:spPr>
+        <p:txBody>
+          <a:bodyPr wrap="square" rtlCol="0">
+            <a:spAutoFit/>
+          </a:bodyPr>
+          <a:lstStyle/>
+          <a:p>
+            <a:pPr marL="285750" indent="-285750">
+              <a:lnSpc>
+                <a:spcPct val="150000"/>
+              </a:lnSpc>
+              <a:buFont typeface="Wingdings" pitchFamily="2" charset="2"/>
+              <a:buChar char="Ø"/>
+            </a:pPr>
+            <a:r>
+              <a:rPr kumimoji="1" lang="ja-JP" altLang="en-US"/>
+              <a:t>隠れ層</a:t>
+            </a:r>
+            <a:r>
+              <a:rPr kumimoji="1" lang="ja-JP" altLang="en-US">
+                <a:solidFill>
+                  <a:srgbClr val="FFFF00"/>
+                </a:solidFill>
+              </a:rPr>
+              <a:t>１６ニューロン</a:t>
+            </a:r>
+            <a:r>
+              <a:rPr kumimoji="1" lang="ja-JP" altLang="en-US"/>
+              <a:t>の場合は最適モデルで</a:t>
+            </a:r>
+            <a:r>
+              <a:rPr kumimoji="1" lang="ja-JP" altLang="en-US">
+                <a:solidFill>
+                  <a:srgbClr val="FFFF00"/>
+                </a:solidFill>
+              </a:rPr>
+              <a:t>８０００エポック</a:t>
+            </a:r>
+            <a:r>
+              <a:rPr kumimoji="1" lang="ja-JP" altLang="en-US"/>
+              <a:t>で学習終了。</a:t>
+            </a:r>
+            <a:endParaRPr kumimoji="1" lang="en-US" altLang="ja-JP" dirty="0"/>
+          </a:p>
+          <a:p>
+            <a:pPr marL="285750" indent="-285750">
+              <a:lnSpc>
+                <a:spcPct val="150000"/>
+              </a:lnSpc>
+              <a:buFont typeface="Wingdings" pitchFamily="2" charset="2"/>
+              <a:buChar char="Ø"/>
+            </a:pPr>
+            <a:endParaRPr kumimoji="1" lang="en-US" altLang="ja-JP" dirty="0"/>
+          </a:p>
+          <a:p>
+            <a:pPr marL="285750" indent="-285750">
+              <a:lnSpc>
+                <a:spcPct val="150000"/>
+              </a:lnSpc>
+              <a:buFont typeface="Wingdings" pitchFamily="2" charset="2"/>
+              <a:buChar char="Ø"/>
+            </a:pPr>
+            <a:r>
+              <a:rPr kumimoji="1" lang="ja-JP" altLang="en-US"/>
+              <a:t>隠れ層１ニューロンの場合は</a:t>
+            </a:r>
+            <a:r>
+              <a:rPr kumimoji="1" lang="ja-JP" altLang="en-US">
+                <a:solidFill>
+                  <a:srgbClr val="FFFF00"/>
+                </a:solidFill>
+              </a:rPr>
+              <a:t>損失関数の値は</a:t>
+            </a:r>
+            <a:r>
+              <a:rPr kumimoji="1" lang="en-US" altLang="ja-JP" dirty="0">
+                <a:solidFill>
+                  <a:srgbClr val="FFFF00"/>
+                </a:solidFill>
+              </a:rPr>
+              <a:t>0.25</a:t>
+            </a:r>
+            <a:r>
+              <a:rPr kumimoji="1" lang="ja-JP" altLang="en-US"/>
+              <a:t>まで減少し、それ以上は進まなかったので学習中止。</a:t>
+            </a:r>
+            <a:endParaRPr kumimoji="1" lang="en-US" altLang="ja-JP" dirty="0"/>
+          </a:p>
+          <a:p>
+            <a:pPr marL="285750" indent="-285750">
+              <a:lnSpc>
+                <a:spcPct val="150000"/>
+              </a:lnSpc>
+              <a:buFont typeface="Wingdings" pitchFamily="2" charset="2"/>
+              <a:buChar char="Ø"/>
+            </a:pPr>
+            <a:endParaRPr kumimoji="1" lang="en-US" altLang="ja-JP" dirty="0"/>
+          </a:p>
+          <a:p>
+            <a:pPr marL="285750" indent="-285750">
+              <a:lnSpc>
+                <a:spcPct val="150000"/>
+              </a:lnSpc>
+              <a:buFont typeface="Wingdings" pitchFamily="2" charset="2"/>
+              <a:buChar char="Ø"/>
+            </a:pPr>
+            <a:r>
+              <a:rPr kumimoji="1" lang="en-US" altLang="ja-JP" dirty="0"/>
+              <a:t>SGD_h4</a:t>
+            </a:r>
+            <a:r>
+              <a:rPr kumimoji="1" lang="ja-JP" altLang="en-US"/>
+              <a:t>は学習終了まで</a:t>
+            </a:r>
+            <a:r>
+              <a:rPr kumimoji="1" lang="en-US" altLang="ja-JP" dirty="0"/>
+              <a:t>SGD_h16</a:t>
+            </a:r>
+            <a:r>
+              <a:rPr kumimoji="1" lang="ja-JP" altLang="en-US"/>
+              <a:t>よりも約</a:t>
+            </a:r>
+            <a:r>
+              <a:rPr kumimoji="1" lang="en-US" altLang="ja-JP" dirty="0">
+                <a:solidFill>
+                  <a:srgbClr val="FFFF00"/>
+                </a:solidFill>
+              </a:rPr>
+              <a:t>4000</a:t>
+            </a:r>
+            <a:r>
+              <a:rPr kumimoji="1" lang="ja-JP" altLang="en-US">
+                <a:solidFill>
+                  <a:srgbClr val="FFFF00"/>
+                </a:solidFill>
+              </a:rPr>
+              <a:t>エポックが多い</a:t>
+            </a:r>
+            <a:r>
+              <a:rPr kumimoji="1" lang="ja-JP" altLang="en-US"/>
+              <a:t>。</a:t>
+            </a:r>
+            <a:endParaRPr kumimoji="1" lang="en-US" altLang="ja-JP" dirty="0"/>
+          </a:p>
+        </p:txBody>
+      </p:sp>
+    </p:spTree>
+    <p:extLst>
+      <p:ext uri="{BB962C8B-B14F-4D97-AF65-F5344CB8AC3E}">
+        <p14:creationId xmlns:p14="http://schemas.microsoft.com/office/powerpoint/2010/main" val="3724053165"/>
+      </p:ext>
+    </p:extLst>
+  </p:cSld>
+  <p:clrMapOvr>
+    <a:masterClrMapping/>
+  </p:clrMapOvr>
+</p:sld>
+</file>
+
+<file path=ppt/slides/slide7.xml><?xml version="1.0" encoding="utf-8"?>
+<p:sld xmlns:a="http://schemas.openxmlformats.org/drawingml/2006/main" xmlns:r="http://schemas.openxmlformats.org/officeDocument/2006/relationships" xmlns:p="http://schemas.openxmlformats.org/presentationml/2006/main">
+  <p:cSld>
+    <p:spTree>
+      <p:nvGrpSpPr>
+        <p:cNvPr id="1" name=""/>
+        <p:cNvGrpSpPr/>
+        <p:nvPr/>
+      </p:nvGrpSpPr>
+      <p:grpSpPr>
+        <a:xfrm>
+          <a:off x="0" y="0"/>
+          <a:ext cx="0" cy="0"/>
+          <a:chOff x="0" y="0"/>
+          <a:chExt cx="0" cy="0"/>
+        </a:xfrm>
+      </p:grpSpPr>
+      <p:sp>
+        <p:nvSpPr>
+          <p:cNvPr id="2" name="タイトル 1">
+            <a:extLst>
+              <a:ext uri="{FF2B5EF4-FFF2-40B4-BE49-F238E27FC236}">
+                <a16:creationId xmlns:a16="http://schemas.microsoft.com/office/drawing/2014/main" id="{D62A7AF9-8FD0-D74F-9D3F-2A68D8620742}"/>
+              </a:ext>
+            </a:extLst>
+          </p:cNvPr>
+          <p:cNvSpPr>
+            <a:spLocks noGrp="1"/>
+          </p:cNvSpPr>
+          <p:nvPr>
+            <p:ph type="title"/>
+          </p:nvPr>
+        </p:nvSpPr>
+        <p:spPr/>
+        <p:txBody>
+          <a:bodyPr/>
+          <a:lstStyle/>
+          <a:p>
+            <a:r>
+              <a:rPr kumimoji="1" lang="ja-JP" altLang="en-US"/>
+              <a:t>学習中の損失関数の値（</a:t>
+            </a:r>
+            <a:r>
+              <a:rPr lang="en-US" altLang="ja-JP" dirty="0" err="1"/>
+              <a:t>ADaGrad</a:t>
+            </a:r>
+            <a:r>
+              <a:rPr lang="en-US" altLang="ja-JP" dirty="0"/>
+              <a:t>, Momentum</a:t>
+            </a:r>
+            <a:r>
+              <a:rPr kumimoji="1" lang="en-US" altLang="ja-JP" dirty="0"/>
+              <a:t>)</a:t>
+            </a:r>
+            <a:endParaRPr kumimoji="1" lang="ja-JP" altLang="en-US"/>
+          </a:p>
+        </p:txBody>
+      </p:sp>
+      <p:pic>
+        <p:nvPicPr>
+          <p:cNvPr id="6" name="図 5">
+            <a:extLst>
+              <a:ext uri="{FF2B5EF4-FFF2-40B4-BE49-F238E27FC236}">
+                <a16:creationId xmlns:a16="http://schemas.microsoft.com/office/drawing/2014/main" id="{ACD121B1-E1C8-2D4E-A578-D6631B4DF23B}"/>
+              </a:ext>
+            </a:extLst>
+          </p:cNvPr>
+          <p:cNvPicPr>
+            <a:picLocks noChangeAspect="1"/>
+          </p:cNvPicPr>
+          <p:nvPr/>
+        </p:nvPicPr>
+        <p:blipFill>
+          <a:blip r:embed="rId2"/>
+          <a:stretch>
+            <a:fillRect/>
+          </a:stretch>
+        </p:blipFill>
+        <p:spPr>
+          <a:xfrm>
+            <a:off x="202394" y="2133048"/>
+            <a:ext cx="5854700" cy="4394200"/>
+          </a:xfrm>
+          <a:prstGeom prst="rect">
+            <a:avLst/>
+          </a:prstGeom>
+        </p:spPr>
+      </p:pic>
+      <p:pic>
+        <p:nvPicPr>
+          <p:cNvPr id="8" name="図 7">
+            <a:extLst>
+              <a:ext uri="{FF2B5EF4-FFF2-40B4-BE49-F238E27FC236}">
+                <a16:creationId xmlns:a16="http://schemas.microsoft.com/office/drawing/2014/main" id="{63421AAF-F30A-6744-816B-275F3AA51E2C}"/>
+              </a:ext>
+            </a:extLst>
+          </p:cNvPr>
+          <p:cNvPicPr>
+            <a:picLocks noChangeAspect="1"/>
+          </p:cNvPicPr>
+          <p:nvPr/>
+        </p:nvPicPr>
+        <p:blipFill>
+          <a:blip r:embed="rId3"/>
+          <a:stretch>
+            <a:fillRect/>
+          </a:stretch>
+        </p:blipFill>
+        <p:spPr>
+          <a:xfrm>
+            <a:off x="6134908" y="2133048"/>
+            <a:ext cx="5854700" cy="4394200"/>
+          </a:xfrm>
+          <a:prstGeom prst="rect">
+            <a:avLst/>
+          </a:prstGeom>
+        </p:spPr>
+      </p:pic>
+    </p:spTree>
+    <p:extLst>
+      <p:ext uri="{BB962C8B-B14F-4D97-AF65-F5344CB8AC3E}">
+        <p14:creationId xmlns:p14="http://schemas.microsoft.com/office/powerpoint/2010/main" val="1545713831"/>
+      </p:ext>
+    </p:extLst>
+  </p:cSld>
+  <p:clrMapOvr>
+    <a:masterClrMapping/>
+  </p:clrMapOvr>
+</p:sld>
+</file>
+
+<file path=ppt/slides/slide8.xml><?xml version="1.0" encoding="utf-8"?>
+<p:sld xmlns:a="http://schemas.openxmlformats.org/drawingml/2006/main" xmlns:r="http://schemas.openxmlformats.org/officeDocument/2006/relationships" xmlns:p="http://schemas.openxmlformats.org/presentationml/2006/main">
+  <p:cSld>
+    <p:spTree>
+      <p:nvGrpSpPr>
+        <p:cNvPr id="1" name=""/>
+        <p:cNvGrpSpPr/>
+        <p:nvPr/>
+      </p:nvGrpSpPr>
+      <p:grpSpPr>
+        <a:xfrm>
+          <a:off x="0" y="0"/>
+          <a:ext cx="0" cy="0"/>
+          <a:chOff x="0" y="0"/>
+          <a:chExt cx="0" cy="0"/>
+        </a:xfrm>
+      </p:grpSpPr>
+      <p:sp>
+        <p:nvSpPr>
+          <p:cNvPr id="2" name="タイトル 1">
+            <a:extLst>
+              <a:ext uri="{FF2B5EF4-FFF2-40B4-BE49-F238E27FC236}">
+                <a16:creationId xmlns:a16="http://schemas.microsoft.com/office/drawing/2014/main" id="{D62A7AF9-8FD0-D74F-9D3F-2A68D8620742}"/>
+              </a:ext>
+            </a:extLst>
+          </p:cNvPr>
+          <p:cNvSpPr>
+            <a:spLocks noGrp="1"/>
+          </p:cNvSpPr>
+          <p:nvPr>
+            <p:ph type="title"/>
+          </p:nvPr>
+        </p:nvSpPr>
+        <p:spPr/>
+        <p:txBody>
+          <a:bodyPr/>
+          <a:lstStyle/>
+          <a:p>
+            <a:r>
+              <a:rPr kumimoji="1" lang="ja-JP" altLang="en-US"/>
+              <a:t>学習中の損失関数の値</a:t>
+            </a:r>
+          </a:p>
+        </p:txBody>
+      </p:sp>
+      <p:sp>
+        <p:nvSpPr>
+          <p:cNvPr id="5" name="テキスト ボックス 4">
+            <a:extLst>
+              <a:ext uri="{FF2B5EF4-FFF2-40B4-BE49-F238E27FC236}">
+                <a16:creationId xmlns:a16="http://schemas.microsoft.com/office/drawing/2014/main" id="{5B773223-D383-F849-8FE4-08F8E5C2BDD5}"/>
+              </a:ext>
+            </a:extLst>
+          </p:cNvPr>
+          <p:cNvSpPr txBox="1"/>
+          <p:nvPr/>
+        </p:nvSpPr>
+        <p:spPr>
+          <a:xfrm>
+            <a:off x="6559550" y="2109230"/>
+            <a:ext cx="4298950" cy="4193905"/>
+          </a:xfrm>
+          <a:prstGeom prst="rect">
+            <a:avLst/>
+          </a:prstGeom>
+          <a:noFill/>
+        </p:spPr>
+        <p:txBody>
+          <a:bodyPr wrap="square" rtlCol="0">
+            <a:spAutoFit/>
+          </a:bodyPr>
+          <a:lstStyle/>
+          <a:p>
+            <a:pPr marL="285750" indent="-285750">
+              <a:lnSpc>
+                <a:spcPct val="150000"/>
+              </a:lnSpc>
+              <a:buFont typeface="Wingdings" pitchFamily="2" charset="2"/>
+              <a:buChar char="Ø"/>
+            </a:pPr>
+            <a:r>
+              <a:rPr kumimoji="1" lang="en-US" altLang="ja-JP" dirty="0"/>
+              <a:t>SGD</a:t>
+            </a:r>
+            <a:r>
+              <a:rPr kumimoji="1" lang="ja-JP" altLang="en-US"/>
+              <a:t>は隠れ層</a:t>
+            </a:r>
+            <a:r>
+              <a:rPr kumimoji="1" lang="ja-JP" altLang="en-US">
+                <a:solidFill>
+                  <a:srgbClr val="FFFF00"/>
+                </a:solidFill>
+              </a:rPr>
+              <a:t>のニューロン数に</a:t>
+            </a:r>
+            <a:r>
+              <a:rPr kumimoji="1" lang="ja-JP" altLang="en-US"/>
+              <a:t>関わらず、学習終了するまでに</a:t>
+            </a:r>
+            <a:r>
+              <a:rPr kumimoji="1" lang="ja-JP" altLang="en-US">
+                <a:solidFill>
+                  <a:srgbClr val="FFFF00"/>
+                </a:solidFill>
+              </a:rPr>
+              <a:t>一番時間がかかること。</a:t>
+            </a:r>
+            <a:endParaRPr kumimoji="1" lang="en-US" altLang="ja-JP" dirty="0"/>
+          </a:p>
+          <a:p>
+            <a:pPr marL="285750" indent="-285750">
+              <a:lnSpc>
+                <a:spcPct val="150000"/>
+              </a:lnSpc>
+              <a:buFont typeface="Wingdings" pitchFamily="2" charset="2"/>
+              <a:buChar char="Ø"/>
+            </a:pPr>
+            <a:endParaRPr kumimoji="1" lang="en-US" altLang="ja-JP" dirty="0"/>
+          </a:p>
+          <a:p>
+            <a:pPr marL="285750" indent="-285750">
+              <a:lnSpc>
+                <a:spcPct val="150000"/>
+              </a:lnSpc>
+              <a:buFont typeface="Wingdings" pitchFamily="2" charset="2"/>
+              <a:buChar char="Ø"/>
+            </a:pPr>
+            <a:r>
+              <a:rPr kumimoji="1" lang="en-US" altLang="ja-JP" dirty="0"/>
+              <a:t>Momentum</a:t>
+            </a:r>
+            <a:r>
+              <a:rPr kumimoji="1" lang="ja-JP" altLang="en-US"/>
+              <a:t>は</a:t>
+            </a:r>
+            <a:r>
+              <a:rPr kumimoji="1" lang="en-US" altLang="ja-JP" dirty="0" err="1"/>
+              <a:t>ADaGrad</a:t>
+            </a:r>
+            <a:r>
+              <a:rPr kumimoji="1" lang="ja-JP" altLang="en-US"/>
+              <a:t>と比べて少し遅いが、</a:t>
+            </a:r>
+            <a:r>
+              <a:rPr kumimoji="1" lang="ja-JP" altLang="en-US">
+                <a:solidFill>
+                  <a:srgbClr val="FFFF00"/>
+                </a:solidFill>
+              </a:rPr>
+              <a:t>無駄の学習</a:t>
+            </a:r>
+            <a:r>
+              <a:rPr kumimoji="1" lang="ja-JP" altLang="en-US"/>
+              <a:t>を避けれる。</a:t>
+            </a:r>
+            <a:endParaRPr kumimoji="1" lang="en-US" altLang="ja-JP" dirty="0"/>
+          </a:p>
+          <a:p>
+            <a:pPr marL="285750" indent="-285750">
+              <a:lnSpc>
+                <a:spcPct val="150000"/>
+              </a:lnSpc>
+              <a:buFont typeface="Wingdings" pitchFamily="2" charset="2"/>
+              <a:buChar char="Ø"/>
+            </a:pPr>
+            <a:endParaRPr kumimoji="1" lang="en-US" altLang="ja-JP" dirty="0"/>
+          </a:p>
+          <a:p>
+            <a:pPr marL="285750" indent="-285750">
+              <a:lnSpc>
+                <a:spcPct val="150000"/>
+              </a:lnSpc>
+              <a:buFont typeface="Wingdings" pitchFamily="2" charset="2"/>
+              <a:buChar char="Ø"/>
+            </a:pPr>
+            <a:r>
+              <a:rPr kumimoji="1" lang="en-US" altLang="ja-JP" dirty="0" err="1"/>
+              <a:t>ADaGrad</a:t>
+            </a:r>
+            <a:r>
+              <a:rPr kumimoji="1" lang="ja-JP" altLang="en-US"/>
+              <a:t>は学習中に</a:t>
+            </a:r>
+            <a:r>
+              <a:rPr kumimoji="1" lang="ja-JP" altLang="en-US">
+                <a:solidFill>
+                  <a:srgbClr val="FFFF00"/>
+                </a:solidFill>
+              </a:rPr>
+              <a:t>学習係数</a:t>
+            </a:r>
+            <a:r>
+              <a:rPr kumimoji="1" lang="ja-JP" altLang="en-US"/>
+              <a:t>が更新されるために学習時間を</a:t>
+            </a:r>
+            <a:r>
+              <a:rPr kumimoji="1" lang="ja-JP" altLang="en-US">
+                <a:solidFill>
+                  <a:srgbClr val="FFFF00"/>
+                </a:solidFill>
+              </a:rPr>
+              <a:t>最小限</a:t>
+            </a:r>
+            <a:r>
+              <a:rPr kumimoji="1" lang="ja-JP" altLang="en-US"/>
+              <a:t>することが可能である。</a:t>
+            </a:r>
+            <a:endParaRPr kumimoji="1" lang="en-US" altLang="ja-JP" dirty="0"/>
+          </a:p>
+        </p:txBody>
+      </p:sp>
+      <p:pic>
+        <p:nvPicPr>
+          <p:cNvPr id="6" name="図 5">
+            <a:extLst>
+              <a:ext uri="{FF2B5EF4-FFF2-40B4-BE49-F238E27FC236}">
+                <a16:creationId xmlns:a16="http://schemas.microsoft.com/office/drawing/2014/main" id="{491B3929-5ADC-8C40-81E3-E93BEFBB786F}"/>
+              </a:ext>
+            </a:extLst>
+          </p:cNvPr>
+          <p:cNvPicPr>
+            <a:picLocks noChangeAspect="1"/>
+          </p:cNvPicPr>
+          <p:nvPr/>
+        </p:nvPicPr>
+        <p:blipFill>
+          <a:blip r:embed="rId2"/>
+          <a:stretch>
+            <a:fillRect/>
+          </a:stretch>
+        </p:blipFill>
+        <p:spPr>
+          <a:xfrm>
+            <a:off x="180285" y="2199308"/>
+            <a:ext cx="5854700" cy="4394200"/>
+          </a:xfrm>
+          <a:prstGeom prst="rect">
+            <a:avLst/>
+          </a:prstGeom>
+        </p:spPr>
+      </p:pic>
+    </p:spTree>
+    <p:extLst>
+      <p:ext uri="{BB962C8B-B14F-4D97-AF65-F5344CB8AC3E}">
+        <p14:creationId xmlns:p14="http://schemas.microsoft.com/office/powerpoint/2010/main" val="518793015"/>
+      </p:ext>
+    </p:extLst>
+  </p:cSld>
+  <p:clrMapOvr>
+    <a:masterClrMapping/>
+  </p:clrMapOvr>
+</p:sld>
+</file>
+
+<file path=ppt/slides/slide9.xml><?xml version="1.0" encoding="utf-8"?>
+<p:sld xmlns:a="http://schemas.openxmlformats.org/drawingml/2006/main" xmlns:r="http://schemas.openxmlformats.org/officeDocument/2006/relationships" xmlns:p="http://schemas.openxmlformats.org/presentationml/2006/main">
+  <p:cSld>
+    <p:spTree>
+      <p:nvGrpSpPr>
+        <p:cNvPr id="1" name=""/>
+        <p:cNvGrpSpPr/>
+        <p:nvPr/>
+      </p:nvGrpSpPr>
+      <p:grpSpPr>
+        <a:xfrm>
+          <a:off x="0" y="0"/>
+          <a:ext cx="0" cy="0"/>
+          <a:chOff x="0" y="0"/>
+          <a:chExt cx="0" cy="0"/>
+        </a:xfrm>
+      </p:grpSpPr>
+      <p:sp>
+        <p:nvSpPr>
+          <p:cNvPr id="2" name="タイトル 1">
+            <a:extLst>
+              <a:ext uri="{FF2B5EF4-FFF2-40B4-BE49-F238E27FC236}">
+                <a16:creationId xmlns:a16="http://schemas.microsoft.com/office/drawing/2014/main" id="{3DF5F37C-20B6-8543-B5CE-0B4FD03BE438}"/>
+              </a:ext>
+            </a:extLst>
+          </p:cNvPr>
+          <p:cNvSpPr>
+            <a:spLocks noGrp="1"/>
+          </p:cNvSpPr>
+          <p:nvPr>
+            <p:ph type="title"/>
+          </p:nvPr>
+        </p:nvSpPr>
+        <p:spPr/>
+        <p:txBody>
+          <a:bodyPr/>
+          <a:lstStyle/>
+          <a:p>
+            <a:r>
+              <a:rPr kumimoji="1" lang="en-US" altLang="ja-JP" dirty="0"/>
+              <a:t>Xavier</a:t>
+            </a:r>
+            <a:r>
+              <a:rPr kumimoji="1" lang="ja-JP" altLang="en-US"/>
+              <a:t>の初期値</a:t>
+            </a:r>
+          </a:p>
+        </p:txBody>
+      </p:sp>
+      <p:pic>
+        <p:nvPicPr>
+          <p:cNvPr id="4" name="図 3">
+            <a:extLst>
+              <a:ext uri="{FF2B5EF4-FFF2-40B4-BE49-F238E27FC236}">
+                <a16:creationId xmlns:a16="http://schemas.microsoft.com/office/drawing/2014/main" id="{2BF9CB4C-A689-6645-B5C1-80855B1493D0}"/>
+              </a:ext>
+            </a:extLst>
+          </p:cNvPr>
+          <p:cNvPicPr>
+            <a:picLocks noChangeAspect="1"/>
+          </p:cNvPicPr>
+          <p:nvPr/>
+        </p:nvPicPr>
+        <p:blipFill>
+          <a:blip r:embed="rId2"/>
+          <a:stretch>
+            <a:fillRect/>
+          </a:stretch>
+        </p:blipFill>
+        <p:spPr>
+          <a:xfrm>
+            <a:off x="6185588" y="2134652"/>
+            <a:ext cx="5854700" cy="4394200"/>
+          </a:xfrm>
+          <a:prstGeom prst="rect">
+            <a:avLst/>
+          </a:prstGeom>
+        </p:spPr>
+      </p:pic>
+      <p:pic>
+        <p:nvPicPr>
+          <p:cNvPr id="6" name="図 5">
+            <a:extLst>
+              <a:ext uri="{FF2B5EF4-FFF2-40B4-BE49-F238E27FC236}">
+                <a16:creationId xmlns:a16="http://schemas.microsoft.com/office/drawing/2014/main" id="{8075C43F-D35A-F340-B086-1FC41FE17B18}"/>
+              </a:ext>
+            </a:extLst>
+          </p:cNvPr>
+          <p:cNvPicPr>
+            <a:picLocks noChangeAspect="1"/>
+          </p:cNvPicPr>
+          <p:nvPr/>
+        </p:nvPicPr>
+        <p:blipFill>
+          <a:blip r:embed="rId3"/>
+          <a:stretch>
+            <a:fillRect/>
+          </a:stretch>
+        </p:blipFill>
+        <p:spPr>
+          <a:xfrm>
+            <a:off x="151712" y="2134652"/>
+            <a:ext cx="5854700" cy="4394200"/>
+          </a:xfrm>
+          <a:prstGeom prst="rect">
+            <a:avLst/>
+          </a:prstGeom>
+        </p:spPr>
+      </p:pic>
+      <p:pic>
+        <p:nvPicPr>
+          <p:cNvPr id="8" name="図 7" descr="グラフ&#10;&#10;自動的に生成された説明">
+            <a:extLst>
+              <a:ext uri="{FF2B5EF4-FFF2-40B4-BE49-F238E27FC236}">
+                <a16:creationId xmlns:a16="http://schemas.microsoft.com/office/drawing/2014/main" id="{020CB42B-EA65-0F4F-83BC-BC1BF2EA2A5A}"/>
+              </a:ext>
+            </a:extLst>
+          </p:cNvPr>
+          <p:cNvPicPr>
+            <a:picLocks noChangeAspect="1"/>
+          </p:cNvPicPr>
+          <p:nvPr/>
+        </p:nvPicPr>
+        <p:blipFill>
+          <a:blip r:embed="rId4"/>
+          <a:stretch>
+            <a:fillRect/>
+          </a:stretch>
+        </p:blipFill>
+        <p:spPr>
+          <a:xfrm>
+            <a:off x="4260093" y="2326850"/>
+            <a:ext cx="4114453" cy="2787210"/>
+          </a:xfrm>
+          <a:prstGeom prst="rect">
+            <a:avLst/>
+          </a:prstGeom>
+        </p:spPr>
+      </p:pic>
+      <p:sp>
+        <p:nvSpPr>
+          <p:cNvPr id="9" name="円/楕円 8">
+            <a:extLst>
+              <a:ext uri="{FF2B5EF4-FFF2-40B4-BE49-F238E27FC236}">
+                <a16:creationId xmlns:a16="http://schemas.microsoft.com/office/drawing/2014/main" id="{00449B76-6433-0540-A708-B4B9A70D5DAF}"/>
+              </a:ext>
+            </a:extLst>
+          </p:cNvPr>
+          <p:cNvSpPr/>
+          <p:nvPr/>
+        </p:nvSpPr>
+        <p:spPr>
+          <a:xfrm>
+            <a:off x="7303551" y="5492224"/>
+            <a:ext cx="524179" cy="524179"/>
+          </a:xfrm>
+          <a:prstGeom prst="ellipse">
+            <a:avLst/>
+          </a:prstGeom>
+          <a:noFill/>
+        </p:spPr>
+        <p:style>
+          <a:lnRef idx="2">
+            <a:schemeClr val="accent1">
+              <a:shade val="50000"/>
+            </a:schemeClr>
+          </a:lnRef>
+          <a:fillRef idx="1">
+            <a:schemeClr val="accent1"/>
+          </a:fillRef>
+          <a:effectRef idx="0">
+            <a:schemeClr val="accent1"/>
+          </a:effectRef>
+          <a:fontRef idx="minor">
+            <a:schemeClr val="lt1"/>
+          </a:fontRef>
+        </p:style>
+        <p:txBody>
+          <a:bodyPr rtlCol="0" anchor="ctr"/>
+          <a:lstStyle/>
+          <a:p>
+            <a:pPr algn="ctr"/>
+            <a:endParaRPr kumimoji="1" lang="ja-JP" altLang="en-US"/>
+          </a:p>
+        </p:txBody>
+      </p:sp>
+      <p:cxnSp>
+        <p:nvCxnSpPr>
+          <p:cNvPr id="11" name="直線矢印コネクタ 10">
+            <a:extLst>
+              <a:ext uri="{FF2B5EF4-FFF2-40B4-BE49-F238E27FC236}">
+                <a16:creationId xmlns:a16="http://schemas.microsoft.com/office/drawing/2014/main" id="{BE25A7F5-8828-3A4E-9BCA-14B7B4D45B60}"/>
+              </a:ext>
+            </a:extLst>
+          </p:cNvPr>
+          <p:cNvCxnSpPr>
+            <a:cxnSpLocks/>
+            <a:stCxn id="9" idx="1"/>
+          </p:cNvCxnSpPr>
+          <p:nvPr/>
+        </p:nvCxnSpPr>
+        <p:spPr>
+          <a:xfrm flipH="1" flipV="1">
+            <a:off x="6823217" y="4816617"/>
+            <a:ext cx="557098" cy="752371"/>
+          </a:xfrm>
+          <a:prstGeom prst="straightConnector1">
+            <a:avLst/>
+          </a:prstGeom>
+          <a:ln w="57150">
+            <a:solidFill>
+              <a:schemeClr val="accent1"/>
+            </a:solidFill>
+            <a:tailEnd type="triangle"/>
+          </a:ln>
+        </p:spPr>
+        <p:style>
+          <a:lnRef idx="1">
+            <a:schemeClr val="accent1"/>
+          </a:lnRef>
+          <a:fillRef idx="0">
+            <a:schemeClr val="accent1"/>
+          </a:fillRef>
+          <a:effectRef idx="0">
+            <a:schemeClr val="accent1"/>
+          </a:effectRef>
+          <a:fontRef idx="minor">
+            <a:schemeClr val="tx1"/>
+          </a:fontRef>
+        </p:style>
+      </p:cxnSp>
+    </p:spTree>
+    <p:extLst>
+      <p:ext uri="{BB962C8B-B14F-4D97-AF65-F5344CB8AC3E}">
+        <p14:creationId xmlns:p14="http://schemas.microsoft.com/office/powerpoint/2010/main" val="2123236864"/>
+      </p:ext>
+    </p:extLst>
+  </p:cSld>
+  <p:clrMapOvr>
+    <a:masterClrMapping/>
+  </p:clrMapOvr>
+  <p:timing>
+    <p:tnLst>
+      <p:par>
+        <p:cTn id="1" dur="indefinite" restart="never" nodeType="tmRoot">
+          <p:childTnLst>
+            <p:seq concurrent="1" nextAc="seek">
+              <p:cTn id="2" dur="indefinite" nodeType="mainSeq">
+                <p:childTnLst>
+                  <p:par>
+                    <p:cTn id="3" fill="hold">
+                      <p:stCondLst>
+                        <p:cond delay="indefinite"/>
+                      </p:stCondLst>
+                      <p:childTnLst>
+                        <p:par>
+                          <p:cTn id="4" fill="hold">
+                            <p:stCondLst>
+                              <p:cond delay="0"/>
+                            </p:stCondLst>
+                            <p:childTnLst>
+                              <p:par>
+                                <p:cTn id="5" presetID="1" presetClass="entr" presetSubtype="0" fill="hold" grpId="0" nodeType="clickEffect">
+                                  <p:stCondLst>
+                                    <p:cond delay="0"/>
+                                  </p:stCondLst>
+                                  <p:childTnLst>
+                                    <p:set>
+                                      <p:cBhvr>
+                                        <p:cTn id="6" dur="1" fill="hold">
+                                          <p:stCondLst>
+                                            <p:cond delay="0"/>
+                                          </p:stCondLst>
+                                        </p:cTn>
+                                        <p:tgtEl>
+                                          <p:spTgt spid="9"/>
+                                        </p:tgtEl>
+                                        <p:attrNameLst>
+                                          <p:attrName>style.visibility</p:attrName>
+                                        </p:attrNameLst>
+                                      </p:cBhvr>
+                                      <p:to>
+                                        <p:strVal val="visible"/>
+                                      </p:to>
+                                    </p:set>
+                                  </p:childTnLst>
+                                </p:cTn>
+                              </p:par>
+                              <p:par>
+                                <p:cTn id="7" presetID="1" presetClass="entr" presetSubtype="0" fill="hold" nodeType="withEffect">
+                                  <p:stCondLst>
+                                    <p:cond delay="0"/>
+                                  </p:stCondLst>
+                                  <p:childTnLst>
+                                    <p:set>
+                                      <p:cBhvr>
+                                        <p:cTn id="8" dur="1" fill="hold">
+                                          <p:stCondLst>
+                                            <p:cond delay="0"/>
+                                          </p:stCondLst>
+                                        </p:cTn>
+                                        <p:tgtEl>
+                                          <p:spTgt spid="11"/>
+                                        </p:tgtEl>
+                                        <p:attrNameLst>
+                                          <p:attrName>style.visibility</p:attrName>
+                                        </p:attrNameLst>
+                                      </p:cBhvr>
+                                      <p:to>
+                                        <p:strVal val="visible"/>
+                                      </p:to>
+                                    </p:set>
+                                  </p:childTnLst>
+                                </p:cTn>
+                              </p:par>
+                            </p:childTnLst>
+                          </p:cTn>
+                        </p:par>
+                      </p:childTnLst>
+                    </p:cTn>
+                  </p:par>
+                  <p:par>
+                    <p:cTn id="9" fill="hold">
+                      <p:stCondLst>
+                        <p:cond delay="indefinite"/>
+                      </p:stCondLst>
+                      <p:childTnLst>
+                        <p:par>
+                          <p:cTn id="10" fill="hold">
+                            <p:stCondLst>
+                              <p:cond delay="0"/>
+                            </p:stCondLst>
+                            <p:childTnLst>
+                              <p:par>
+                                <p:cTn id="11" presetID="37" presetClass="entr" presetSubtype="0" fill="hold" nodeType="clickEffect">
+                                  <p:stCondLst>
+                                    <p:cond delay="0"/>
+                                  </p:stCondLst>
+                                  <p:childTnLst>
+                                    <p:set>
+                                      <p:cBhvr>
+                                        <p:cTn id="12" dur="1" fill="hold">
+                                          <p:stCondLst>
+                                            <p:cond delay="0"/>
+                                          </p:stCondLst>
+                                        </p:cTn>
+                                        <p:tgtEl>
+                                          <p:spTgt spid="8"/>
+                                        </p:tgtEl>
+                                        <p:attrNameLst>
+                                          <p:attrName>style.visibility</p:attrName>
+                                        </p:attrNameLst>
+                                      </p:cBhvr>
+                                      <p:to>
+                                        <p:strVal val="visible"/>
+                                      </p:to>
+                                    </p:set>
+                                    <p:animEffect transition="in" filter="fade">
+                                      <p:cBhvr>
+                                        <p:cTn id="13" dur="1000"/>
+                                        <p:tgtEl>
+                                          <p:spTgt spid="8"/>
+                                        </p:tgtEl>
+                                      </p:cBhvr>
+                                    </p:animEffect>
+                                    <p:anim calcmode="lin" valueType="num">
+                                      <p:cBhvr>
+                                        <p:cTn id="14" dur="1000" fill="hold"/>
+                                        <p:tgtEl>
+                                          <p:spTgt spid="8"/>
+                                        </p:tgtEl>
+                                        <p:attrNameLst>
+                                          <p:attrName>ppt_x</p:attrName>
+                                        </p:attrNameLst>
+                                      </p:cBhvr>
+                                      <p:tavLst>
+                                        <p:tav tm="0">
+                                          <p:val>
+                                            <p:strVal val="#ppt_x"/>
+                                          </p:val>
+                                        </p:tav>
+                                        <p:tav tm="100000">
+                                          <p:val>
+                                            <p:strVal val="#ppt_x"/>
+                                          </p:val>
+                                        </p:tav>
+                                      </p:tavLst>
+                                    </p:anim>
+                                    <p:anim calcmode="lin" valueType="num">
+                                      <p:cBhvr>
+                                        <p:cTn id="15" dur="900" decel="100000" fill="hold"/>
+                                        <p:tgtEl>
+                                          <p:spTgt spid="8"/>
+                                        </p:tgtEl>
+                                        <p:attrNameLst>
+                                          <p:attrName>ppt_y</p:attrName>
+                                        </p:attrNameLst>
+                                      </p:cBhvr>
+                                      <p:tavLst>
+                                        <p:tav tm="0">
+                                          <p:val>
+                                            <p:strVal val="#ppt_y+1"/>
+                                          </p:val>
+                                        </p:tav>
+                                        <p:tav tm="100000">
+                                          <p:val>
+                                            <p:strVal val="#ppt_y-.03"/>
+                                          </p:val>
+                                        </p:tav>
+                                      </p:tavLst>
+                                    </p:anim>
+                                    <p:anim calcmode="lin" valueType="num">
+                                      <p:cBhvr>
+                                        <p:cTn id="16" dur="100" accel="100000" fill="hold">
+                                          <p:stCondLst>
+                                            <p:cond delay="900"/>
+                                          </p:stCondLst>
+                                        </p:cTn>
+                                        <p:tgtEl>
+                                          <p:spTgt spid="8"/>
+                                        </p:tgtEl>
+                                        <p:attrNameLst>
+                                          <p:attrName>ppt_y</p:attrName>
+                                        </p:attrNameLst>
+                                      </p:cBhvr>
+                                      <p:tavLst>
+                                        <p:tav tm="0">
+                                          <p:val>
+                                            <p:strVal val="#ppt_y-.03"/>
+                                          </p:val>
+                                        </p:tav>
+                                        <p:tav tm="100000">
+                                          <p:val>
+                                            <p:strVal val="#ppt_y"/>
+                                          </p:val>
+                                        </p:tav>
+                                      </p:tavLst>
+                                    </p:anim>
+                                  </p:childTnLst>
+                                </p:cTn>
+                              </p:par>
+                            </p:childTnLst>
+                          </p:cTn>
+                        </p:par>
+                      </p:childTnLst>
+                    </p:cTn>
+                  </p:par>
+                </p:childTnLst>
+              </p:cTn>
+              <p:prevCondLst>
+                <p:cond evt="onPrev" delay="0">
+                  <p:tgtEl>
+                    <p:sldTgt/>
+                  </p:tgtEl>
+                </p:cond>
+              </p:prevCondLst>
+              <p:nextCondLst>
+                <p:cond evt="onNext" delay="0">
+                  <p:tgtEl>
+                    <p:sldTgt/>
+                  </p:tgtEl>
+                </p:cond>
+              </p:nextCondLst>
+            </p:seq>
+          </p:childTnLst>
+        </p:cTn>
+      </p:par>
+    </p:tnLst>
+    <p:bldLst>
+      <p:bldP spid="9" grpId="0" animBg="1"/>
+    </p:bldLst>
+  </p:timing>
 </p:sld>
 </file>
 

</xml_diff>